<commit_message>
added links to tooltips
</commit_message>
<xml_diff>
--- a/ChartExplainerAndUnitandSource_links.pptx
+++ b/ChartExplainerAndUnitandSource_links.pptx
@@ -192,8 +192,7 @@
 <p:cmLst xmlns:a="http://schemas.openxmlformats.org/drawingml/2006/main" xmlns:r="http://schemas.openxmlformats.org/officeDocument/2006/relationships" xmlns:p="http://schemas.openxmlformats.org/presentationml/2006/main">
   <p:cm authorId="1" dt="2021-09-29T06:56:19.261" idx="1">
     <p:pos x="5412" y="1278"/>
-    <p:text>This is PRESS data
-</p:text>
+    <p:text>This is PRESS data</p:text>
     <p:extLst>
       <p:ext uri="{C676402C-5697-4E1C-873F-D02D1690AC5C}">
         <p15:threadingInfo xmlns:p15="http://schemas.microsoft.com/office/powerpoint/2012/main" timeZoneBias="420"/>
@@ -202,8 +201,7 @@
   </p:cm>
   <p:cm authorId="2" dt="2021-09-29T11:44:12.215" idx="1">
     <p:pos x="5412" y="1374"/>
-    <p:text>This is actually from NSDS. Use the same phrasing as in the equivalent feature in gender channel: "Source: The country's NSDS and other planning documents. See the methodology note for details.​"
-</p:text>
+    <p:text>This is actually from NSDS. Use the same phrasing as in the equivalent feature in gender channel: "Source: The country's NSDS and other planning documents. See the methodology note for details.​"</p:text>
     <p:extLst>
       <p:ext uri="{C676402C-5697-4E1C-873F-D02D1690AC5C}">
         <p15:threadingInfo xmlns:p15="http://schemas.microsoft.com/office/powerpoint/2012/main" timeZoneBias="420">
@@ -373,7 +371,7 @@
           <a:p>
             <a:fld id="{EE288CDE-CD3E-434A-893C-DE213E5456F5}" type="datetimeFigureOut">
               <a:rPr lang="en-GB" smtClean="0"/>
-              <a:t>24/10/2022</a:t>
+              <a:t>28/10/2022</a:t>
             </a:fld>
             <a:endParaRPr lang="en-GB"/>
           </a:p>
@@ -543,7 +541,7 @@
           <a:p>
             <a:fld id="{EE288CDE-CD3E-434A-893C-DE213E5456F5}" type="datetimeFigureOut">
               <a:rPr lang="en-GB" smtClean="0"/>
-              <a:t>24/10/2022</a:t>
+              <a:t>28/10/2022</a:t>
             </a:fld>
             <a:endParaRPr lang="en-GB"/>
           </a:p>
@@ -723,7 +721,7 @@
           <a:p>
             <a:fld id="{EE288CDE-CD3E-434A-893C-DE213E5456F5}" type="datetimeFigureOut">
               <a:rPr lang="en-GB" smtClean="0"/>
-              <a:t>24/10/2022</a:t>
+              <a:t>28/10/2022</a:t>
             </a:fld>
             <a:endParaRPr lang="en-GB"/>
           </a:p>
@@ -893,7 +891,7 @@
           <a:p>
             <a:fld id="{EE288CDE-CD3E-434A-893C-DE213E5456F5}" type="datetimeFigureOut">
               <a:rPr lang="en-GB" smtClean="0"/>
-              <a:t>24/10/2022</a:t>
+              <a:t>28/10/2022</a:t>
             </a:fld>
             <a:endParaRPr lang="en-GB"/>
           </a:p>
@@ -1139,7 +1137,7 @@
           <a:p>
             <a:fld id="{EE288CDE-CD3E-434A-893C-DE213E5456F5}" type="datetimeFigureOut">
               <a:rPr lang="en-GB" smtClean="0"/>
-              <a:t>24/10/2022</a:t>
+              <a:t>28/10/2022</a:t>
             </a:fld>
             <a:endParaRPr lang="en-GB"/>
           </a:p>
@@ -1371,7 +1369,7 @@
           <a:p>
             <a:fld id="{EE288CDE-CD3E-434A-893C-DE213E5456F5}" type="datetimeFigureOut">
               <a:rPr lang="en-GB" smtClean="0"/>
-              <a:t>24/10/2022</a:t>
+              <a:t>28/10/2022</a:t>
             </a:fld>
             <a:endParaRPr lang="en-GB"/>
           </a:p>
@@ -1738,7 +1736,7 @@
           <a:p>
             <a:fld id="{EE288CDE-CD3E-434A-893C-DE213E5456F5}" type="datetimeFigureOut">
               <a:rPr lang="en-GB" smtClean="0"/>
-              <a:t>24/10/2022</a:t>
+              <a:t>28/10/2022</a:t>
             </a:fld>
             <a:endParaRPr lang="en-GB"/>
           </a:p>
@@ -1856,7 +1854,7 @@
           <a:p>
             <a:fld id="{EE288CDE-CD3E-434A-893C-DE213E5456F5}" type="datetimeFigureOut">
               <a:rPr lang="en-GB" smtClean="0"/>
-              <a:t>24/10/2022</a:t>
+              <a:t>28/10/2022</a:t>
             </a:fld>
             <a:endParaRPr lang="en-GB"/>
           </a:p>
@@ -1951,7 +1949,7 @@
           <a:p>
             <a:fld id="{EE288CDE-CD3E-434A-893C-DE213E5456F5}" type="datetimeFigureOut">
               <a:rPr lang="en-GB" smtClean="0"/>
-              <a:t>24/10/2022</a:t>
+              <a:t>28/10/2022</a:t>
             </a:fld>
             <a:endParaRPr lang="en-GB"/>
           </a:p>
@@ -2228,7 +2226,7 @@
           <a:p>
             <a:fld id="{EE288CDE-CD3E-434A-893C-DE213E5456F5}" type="datetimeFigureOut">
               <a:rPr lang="en-GB" smtClean="0"/>
-              <a:t>24/10/2022</a:t>
+              <a:t>28/10/2022</a:t>
             </a:fld>
             <a:endParaRPr lang="en-GB"/>
           </a:p>
@@ -2481,7 +2479,7 @@
           <a:p>
             <a:fld id="{EE288CDE-CD3E-434A-893C-DE213E5456F5}" type="datetimeFigureOut">
               <a:rPr lang="en-GB" smtClean="0"/>
-              <a:t>24/10/2022</a:t>
+              <a:t>28/10/2022</a:t>
             </a:fld>
             <a:endParaRPr lang="en-GB"/>
           </a:p>
@@ -2694,7 +2692,7 @@
           <a:p>
             <a:fld id="{EE288CDE-CD3E-434A-893C-DE213E5456F5}" type="datetimeFigureOut">
               <a:rPr lang="en-GB" smtClean="0"/>
-              <a:t>24/10/2022</a:t>
+              <a:t>28/10/2022</a:t>
             </a:fld>
             <a:endParaRPr lang="en-GB"/>
           </a:p>
@@ -4973,7 +4971,7 @@
           <a:lstStyle/>
           <a:p>
             <a:r>
-              <a:rPr lang="en-GB" sz="1200">
+              <a:rPr lang="en-GB" sz="1200" dirty="0">
                 <a:solidFill>
                   <a:schemeClr val="bg1">
                     <a:lumMod val="50000"/>
@@ -4983,7 +4981,7 @@
               <a:t>The values are in USD. Source: </a:t>
             </a:r>
             <a:r>
-              <a:rPr lang="en-US" sz="1200">
+              <a:rPr lang="en-US" sz="1200" dirty="0">
                 <a:solidFill>
                   <a:schemeClr val="bg1">
                     <a:lumMod val="50000"/>
@@ -4993,17 +4991,18 @@
               <a:t>PARIS21 (2021), Partner Report on Support to Statistics. See the </a:t>
             </a:r>
             <a:r>
-              <a:rPr lang="en-US" sz="1200" u="sng">
+              <a:rPr lang="en-US" sz="1200" u="sng" dirty="0">
                 <a:solidFill>
                   <a:schemeClr val="bg1">
                     <a:lumMod val="50000"/>
                   </a:schemeClr>
                 </a:solidFill>
+                <a:hlinkClick r:id="rId3"/>
               </a:rPr>
               <a:t>methodology note </a:t>
             </a:r>
             <a:r>
-              <a:rPr lang="en-US" sz="1200">
+              <a:rPr lang="en-US" sz="1200" dirty="0">
                 <a:solidFill>
                   <a:schemeClr val="bg1">
                     <a:lumMod val="50000"/>
@@ -5012,11 +5011,55 @@
               </a:rPr>
               <a:t>for details.</a:t>
             </a:r>
-            <a:endParaRPr lang="en-GB" sz="1200">
+            <a:endParaRPr lang="en-GB" sz="1200" dirty="0">
               <a:solidFill>
                 <a:schemeClr val="bg1">
                   <a:lumMod val="50000"/>
                 </a:schemeClr>
+              </a:solidFill>
+            </a:endParaRPr>
+          </a:p>
+        </p:txBody>
+      </p:sp>
+      <p:sp>
+        <p:nvSpPr>
+          <p:cNvPr id="3" name="TextBox 2">
+            <a:extLst>
+              <a:ext uri="{FF2B5EF4-FFF2-40B4-BE49-F238E27FC236}">
+                <a16:creationId xmlns:a16="http://schemas.microsoft.com/office/drawing/2014/main" id="{40491698-0D10-A7D1-D279-5B31D21BDC95}"/>
+              </a:ext>
+            </a:extLst>
+          </p:cNvPr>
+          <p:cNvSpPr txBox="1"/>
+          <p:nvPr/>
+        </p:nvSpPr>
+        <p:spPr>
+          <a:xfrm>
+            <a:off x="5660646" y="2387638"/>
+            <a:ext cx="5147563" cy="246221"/>
+          </a:xfrm>
+          <a:prstGeom prst="rect">
+            <a:avLst/>
+          </a:prstGeom>
+          <a:noFill/>
+        </p:spPr>
+        <p:txBody>
+          <a:bodyPr wrap="none" rtlCol="0">
+            <a:spAutoFit/>
+          </a:bodyPr>
+          <a:lstStyle/>
+          <a:p>
+            <a:r>
+              <a:rPr lang="en-US" sz="1000" dirty="0">
+                <a:solidFill>
+                  <a:srgbClr val="00B0F0"/>
+                </a:solidFill>
+              </a:rPr>
+              <a:t>https://paris21-data.github.io/CH_methodology_note/about-the-data.html#paris21-press-data</a:t>
+            </a:r>
+            <a:endParaRPr lang="en-DE" sz="1000" dirty="0">
+              <a:solidFill>
+                <a:srgbClr val="00B0F0"/>
               </a:solidFill>
             </a:endParaRPr>
           </a:p>
@@ -5289,7 +5332,9 @@
               <a:t>See the </a:t>
             </a:r>
             <a:r>
-              <a:rPr lang="en-US" sz="1400" u="sng" dirty="0"/>
+              <a:rPr lang="en-US" sz="1400" u="sng" dirty="0">
+                <a:hlinkClick r:id="rId4"/>
+              </a:rPr>
               <a:t>methodology note </a:t>
             </a:r>
             <a:r>
@@ -5362,7 +5407,7 @@
             <p:nvPr/>
           </p:nvPicPr>
           <p:blipFill rotWithShape="1">
-            <a:blip r:embed="rId4"/>
+            <a:blip r:embed="rId5"/>
             <a:srcRect r="37744" b="11026"/>
             <a:stretch/>
           </p:blipFill>
@@ -5385,7 +5430,7 @@
             <p:nvPr/>
           </p:nvPicPr>
           <p:blipFill>
-            <a:blip r:embed="rId5" cstate="print">
+            <a:blip r:embed="rId6" cstate="print">
               <a:extLst>
                 <a:ext uri="{28A0092B-C50C-407E-A947-70E740481C1C}">
                   <a14:useLocalDpi xmlns:a14="http://schemas.microsoft.com/office/drawing/2010/main" val="0"/>
@@ -5523,25 +5568,27 @@
           <a:lstStyle/>
           <a:p>
             <a:r>
-              <a:rPr lang="en-GB" sz="1400"/>
+              <a:rPr lang="en-GB" sz="1400" dirty="0"/>
               <a:t>Source: UNSD, World Bank, and PARIS21 (2021), Cape Town Global Action Plan Monitoring Survey. </a:t>
             </a:r>
             <a:r>
-              <a:rPr lang="en-US" sz="1400"/>
+              <a:rPr lang="en-US" sz="1400" dirty="0"/>
               <a:t>See the </a:t>
             </a:r>
             <a:r>
-              <a:rPr lang="en-US" sz="1400" u="sng"/>
+              <a:rPr lang="en-US" sz="1400" u="sng" dirty="0">
+                <a:hlinkClick r:id="rId4"/>
+              </a:rPr>
               <a:t>methodology note </a:t>
             </a:r>
             <a:r>
-              <a:rPr lang="en-US" sz="1400"/>
+              <a:rPr lang="en-US" sz="1400" dirty="0"/>
               <a:t>for details.</a:t>
             </a:r>
-            <a:endParaRPr lang="en-GB" sz="1400"/>
-          </a:p>
-          <a:p>
-            <a:endParaRPr lang="en-GB" sz="1400"/>
+            <a:endParaRPr lang="en-GB" sz="1400" dirty="0"/>
+          </a:p>
+          <a:p>
+            <a:endParaRPr lang="en-GB" sz="1400" dirty="0"/>
           </a:p>
         </p:txBody>
       </p:sp>
@@ -5580,7 +5627,9 @@
               <a:t>See the </a:t>
             </a:r>
             <a:r>
-              <a:rPr lang="en-US" sz="1400" u="sng" dirty="0"/>
+              <a:rPr lang="en-US" sz="1400" u="sng" dirty="0">
+                <a:hlinkClick r:id="rId4"/>
+              </a:rPr>
               <a:t>methodology note </a:t>
             </a:r>
             <a:r>
@@ -5696,7 +5745,7 @@
             <p:nvPr/>
           </p:nvPicPr>
           <p:blipFill rotWithShape="1">
-            <a:blip r:embed="rId4"/>
+            <a:blip r:embed="rId5"/>
             <a:srcRect r="37744" b="11026"/>
             <a:stretch/>
           </p:blipFill>
@@ -5719,7 +5768,7 @@
             <p:nvPr/>
           </p:nvPicPr>
           <p:blipFill>
-            <a:blip r:embed="rId5" cstate="print">
+            <a:blip r:embed="rId6" cstate="print">
               <a:extLst>
                 <a:ext uri="{28A0092B-C50C-407E-A947-70E740481C1C}">
                   <a14:useLocalDpi xmlns:a14="http://schemas.microsoft.com/office/drawing/2010/main" val="0"/>
@@ -5830,6 +5879,173 @@
           </p:style>
         </p:cxnSp>
       </p:grpSp>
+      <p:sp>
+        <p:nvSpPr>
+          <p:cNvPr id="3" name="TextBox 2">
+            <a:extLst>
+              <a:ext uri="{FF2B5EF4-FFF2-40B4-BE49-F238E27FC236}">
+                <a16:creationId xmlns:a16="http://schemas.microsoft.com/office/drawing/2014/main" id="{84792888-43CF-1ED9-C200-C6471F4A2BC9}"/>
+              </a:ext>
+            </a:extLst>
+          </p:cNvPr>
+          <p:cNvSpPr txBox="1"/>
+          <p:nvPr/>
+        </p:nvSpPr>
+        <p:spPr>
+          <a:xfrm>
+            <a:off x="6947003" y="1620891"/>
+            <a:ext cx="1915091" cy="1015663"/>
+          </a:xfrm>
+          <a:prstGeom prst="rect">
+            <a:avLst/>
+          </a:prstGeom>
+          <a:noFill/>
+        </p:spPr>
+        <p:txBody>
+          <a:bodyPr wrap="square" rtlCol="0">
+            <a:spAutoFit/>
+          </a:bodyPr>
+          <a:lstStyle/>
+          <a:p>
+            <a:r>
+              <a:rPr lang="en-US" sz="1000" dirty="0">
+                <a:solidFill>
+                  <a:srgbClr val="00B0F0"/>
+                </a:solidFill>
+              </a:rPr>
+              <a:t>https://paris21-data.github.io/CH_methodology_note/about-the-data.html#unsd-world-bank-paris21-cape-town-global-action-plan-implementation-survey</a:t>
+            </a:r>
+            <a:endParaRPr lang="en-DE" sz="1000" dirty="0">
+              <a:solidFill>
+                <a:srgbClr val="00B0F0"/>
+              </a:solidFill>
+            </a:endParaRPr>
+          </a:p>
+        </p:txBody>
+      </p:sp>
+      <p:cxnSp>
+        <p:nvCxnSpPr>
+          <p:cNvPr id="5" name="Straight Arrow Connector 4">
+            <a:extLst>
+              <a:ext uri="{FF2B5EF4-FFF2-40B4-BE49-F238E27FC236}">
+                <a16:creationId xmlns:a16="http://schemas.microsoft.com/office/drawing/2014/main" id="{E4EB4C7F-FD87-939D-7D42-B9BC66504CE9}"/>
+              </a:ext>
+            </a:extLst>
+          </p:cNvPr>
+          <p:cNvCxnSpPr>
+            <a:cxnSpLocks/>
+          </p:cNvCxnSpPr>
+          <p:nvPr/>
+        </p:nvCxnSpPr>
+        <p:spPr>
+          <a:xfrm flipH="1">
+            <a:off x="8005482" y="2743200"/>
+            <a:ext cx="370805" cy="1631576"/>
+          </a:xfrm>
+          <a:prstGeom prst="straightConnector1">
+            <a:avLst/>
+          </a:prstGeom>
+          <a:ln>
+            <a:tailEnd type="triangle"/>
+          </a:ln>
+        </p:spPr>
+        <p:style>
+          <a:lnRef idx="1">
+            <a:schemeClr val="accent1"/>
+          </a:lnRef>
+          <a:fillRef idx="0">
+            <a:schemeClr val="accent1"/>
+          </a:fillRef>
+          <a:effectRef idx="0">
+            <a:schemeClr val="accent1"/>
+          </a:effectRef>
+          <a:fontRef idx="minor">
+            <a:schemeClr val="tx1"/>
+          </a:fontRef>
+        </p:style>
+      </p:cxnSp>
+      <p:cxnSp>
+        <p:nvCxnSpPr>
+          <p:cNvPr id="30" name="Straight Arrow Connector 29">
+            <a:extLst>
+              <a:ext uri="{FF2B5EF4-FFF2-40B4-BE49-F238E27FC236}">
+                <a16:creationId xmlns:a16="http://schemas.microsoft.com/office/drawing/2014/main" id="{28E48C39-8858-D3BA-6BD3-F6187ACA432F}"/>
+              </a:ext>
+            </a:extLst>
+          </p:cNvPr>
+          <p:cNvCxnSpPr>
+            <a:cxnSpLocks/>
+          </p:cNvCxnSpPr>
+          <p:nvPr/>
+        </p:nvCxnSpPr>
+        <p:spPr>
+          <a:xfrm flipH="1">
+            <a:off x="5664423" y="2721780"/>
+            <a:ext cx="1282580" cy="2666008"/>
+          </a:xfrm>
+          <a:prstGeom prst="straightConnector1">
+            <a:avLst/>
+          </a:prstGeom>
+          <a:ln>
+            <a:tailEnd type="triangle"/>
+          </a:ln>
+        </p:spPr>
+        <p:style>
+          <a:lnRef idx="1">
+            <a:schemeClr val="accent1"/>
+          </a:lnRef>
+          <a:fillRef idx="0">
+            <a:schemeClr val="accent1"/>
+          </a:fillRef>
+          <a:effectRef idx="0">
+            <a:schemeClr val="accent1"/>
+          </a:effectRef>
+          <a:fontRef idx="minor">
+            <a:schemeClr val="tx1"/>
+          </a:fontRef>
+        </p:style>
+      </p:cxnSp>
+      <p:cxnSp>
+        <p:nvCxnSpPr>
+          <p:cNvPr id="35" name="Straight Arrow Connector 34">
+            <a:extLst>
+              <a:ext uri="{FF2B5EF4-FFF2-40B4-BE49-F238E27FC236}">
+                <a16:creationId xmlns:a16="http://schemas.microsoft.com/office/drawing/2014/main" id="{E25906D1-0679-41B5-E319-80A1BF77911F}"/>
+              </a:ext>
+            </a:extLst>
+          </p:cNvPr>
+          <p:cNvCxnSpPr>
+            <a:cxnSpLocks/>
+          </p:cNvCxnSpPr>
+          <p:nvPr/>
+        </p:nvCxnSpPr>
+        <p:spPr>
+          <a:xfrm flipH="1">
+            <a:off x="5450541" y="2501699"/>
+            <a:ext cx="1379002" cy="220081"/>
+          </a:xfrm>
+          <a:prstGeom prst="straightConnector1">
+            <a:avLst/>
+          </a:prstGeom>
+          <a:ln>
+            <a:tailEnd type="triangle"/>
+          </a:ln>
+        </p:spPr>
+        <p:style>
+          <a:lnRef idx="1">
+            <a:schemeClr val="accent1"/>
+          </a:lnRef>
+          <a:fillRef idx="0">
+            <a:schemeClr val="accent1"/>
+          </a:fillRef>
+          <a:effectRef idx="0">
+            <a:schemeClr val="accent1"/>
+          </a:effectRef>
+          <a:fontRef idx="minor">
+            <a:schemeClr val="tx1"/>
+          </a:fontRef>
+        </p:style>
+      </p:cxnSp>
     </p:spTree>
     <p:extLst>
       <p:ext uri="{BB962C8B-B14F-4D97-AF65-F5344CB8AC3E}">
@@ -6193,22 +6409,24 @@
           <a:lstStyle/>
           <a:p>
             <a:r>
-              <a:rPr lang="en-GB" sz="1400"/>
+              <a:rPr lang="en-GB" sz="1400" dirty="0"/>
               <a:t>Source: UNSD, World Bank, and PARIS21 (2021), Cape Town Global Action Plan Monitoring Survey. </a:t>
             </a:r>
             <a:r>
-              <a:rPr lang="en-US" sz="1400"/>
+              <a:rPr lang="en-US" sz="1400" dirty="0"/>
               <a:t>See the </a:t>
             </a:r>
             <a:r>
-              <a:rPr lang="en-US" sz="1400" u="sng"/>
+              <a:rPr lang="en-US" sz="1400" u="sng" dirty="0">
+                <a:hlinkClick r:id="rId5"/>
+              </a:rPr>
               <a:t>methodology note </a:t>
             </a:r>
             <a:r>
-              <a:rPr lang="en-US" sz="1400"/>
+              <a:rPr lang="en-US" sz="1400" dirty="0"/>
               <a:t>for details.</a:t>
             </a:r>
-            <a:endParaRPr lang="en-GB" sz="1400"/>
+            <a:endParaRPr lang="en-GB" sz="1400" dirty="0"/>
           </a:p>
         </p:txBody>
       </p:sp>
@@ -6239,22 +6457,24 @@
           <a:lstStyle/>
           <a:p>
             <a:r>
-              <a:rPr lang="en-GB" sz="1400"/>
+              <a:rPr lang="en-GB" sz="1400" dirty="0"/>
               <a:t>Source: UNSD, World Bank, and PARIS21 (2021), Cape Town Global Action Plan Monitoring Survey. </a:t>
             </a:r>
             <a:r>
-              <a:rPr lang="en-US" sz="1400"/>
+              <a:rPr lang="en-US" sz="1400" dirty="0"/>
               <a:t>See the </a:t>
             </a:r>
             <a:r>
-              <a:rPr lang="en-US" sz="1400" u="sng"/>
+              <a:rPr lang="en-US" sz="1400" u="sng" dirty="0">
+                <a:hlinkClick r:id="rId5"/>
+              </a:rPr>
               <a:t>methodology note </a:t>
             </a:r>
             <a:r>
-              <a:rPr lang="en-US" sz="1400"/>
+              <a:rPr lang="en-US" sz="1400" dirty="0"/>
               <a:t>for details.</a:t>
             </a:r>
-            <a:endParaRPr lang="en-GB" sz="1400"/>
+            <a:endParaRPr lang="en-GB" sz="1400" dirty="0"/>
           </a:p>
         </p:txBody>
       </p:sp>
@@ -6293,15 +6513,232 @@
                 <a:ea typeface="+mn-lt"/>
                 <a:cs typeface="+mn-lt"/>
               </a:rPr>
-              <a:t> The country's NSDS and other planning documents. See the methodology note for details. </a:t>
-            </a:r>
-            <a:endParaRPr lang="en-GB">
-              <a:ea typeface="+mn-lt"/>
-              <a:cs typeface="+mn-lt"/>
+              <a:t> The country's NSDS and other planning documents. See the </a:t>
+            </a:r>
+            <a:r>
+              <a:rPr lang="en-GB" dirty="0">
+                <a:ea typeface="+mn-lt"/>
+                <a:cs typeface="+mn-lt"/>
+                <a:hlinkClick r:id="rId6"/>
+              </a:rPr>
+              <a:t>methodology note</a:t>
+            </a:r>
+            <a:r>
+              <a:rPr lang="en-GB" dirty="0">
+                <a:ea typeface="+mn-lt"/>
+                <a:cs typeface="+mn-lt"/>
+              </a:rPr>
+              <a:t> for details. </a:t>
+            </a:r>
+          </a:p>
+        </p:txBody>
+      </p:sp>
+      <p:sp>
+        <p:nvSpPr>
+          <p:cNvPr id="4" name="TextBox 3">
+            <a:extLst>
+              <a:ext uri="{FF2B5EF4-FFF2-40B4-BE49-F238E27FC236}">
+                <a16:creationId xmlns:a16="http://schemas.microsoft.com/office/drawing/2014/main" id="{7BA462BE-70ED-003D-1A1B-26896FF079A1}"/>
+              </a:ext>
+            </a:extLst>
+          </p:cNvPr>
+          <p:cNvSpPr txBox="1"/>
+          <p:nvPr/>
+        </p:nvSpPr>
+        <p:spPr>
+          <a:xfrm>
+            <a:off x="9717097" y="3876443"/>
+            <a:ext cx="1915091" cy="1015663"/>
+          </a:xfrm>
+          <a:prstGeom prst="rect">
+            <a:avLst/>
+          </a:prstGeom>
+          <a:noFill/>
+        </p:spPr>
+        <p:txBody>
+          <a:bodyPr wrap="square" rtlCol="0">
+            <a:spAutoFit/>
+          </a:bodyPr>
+          <a:lstStyle/>
+          <a:p>
+            <a:r>
+              <a:rPr lang="en-US" sz="1000" dirty="0">
+                <a:solidFill>
+                  <a:srgbClr val="00B0F0"/>
+                </a:solidFill>
+              </a:rPr>
+              <a:t>https://paris21-data.github.io/CH_methodology_note/about-the-data.html#unsd-world-bank-paris21-cape-town-global-action-plan-implementation-survey</a:t>
+            </a:r>
+            <a:endParaRPr lang="en-DE" sz="1000" dirty="0">
+              <a:solidFill>
+                <a:srgbClr val="00B0F0"/>
+              </a:solidFill>
             </a:endParaRPr>
           </a:p>
         </p:txBody>
       </p:sp>
+      <p:cxnSp>
+        <p:nvCxnSpPr>
+          <p:cNvPr id="8" name="Straight Arrow Connector 7">
+            <a:extLst>
+              <a:ext uri="{FF2B5EF4-FFF2-40B4-BE49-F238E27FC236}">
+                <a16:creationId xmlns:a16="http://schemas.microsoft.com/office/drawing/2014/main" id="{81B460F4-C05C-735B-0791-8522F31BC9C4}"/>
+              </a:ext>
+            </a:extLst>
+          </p:cNvPr>
+          <p:cNvCxnSpPr>
+            <a:cxnSpLocks/>
+          </p:cNvCxnSpPr>
+          <p:nvPr/>
+        </p:nvCxnSpPr>
+        <p:spPr>
+          <a:xfrm flipH="1">
+            <a:off x="3204714" y="4449175"/>
+            <a:ext cx="6219279" cy="129412"/>
+          </a:xfrm>
+          <a:prstGeom prst="straightConnector1">
+            <a:avLst/>
+          </a:prstGeom>
+          <a:ln>
+            <a:tailEnd type="triangle"/>
+          </a:ln>
+        </p:spPr>
+        <p:style>
+          <a:lnRef idx="1">
+            <a:schemeClr val="accent1"/>
+          </a:lnRef>
+          <a:fillRef idx="0">
+            <a:schemeClr val="accent1"/>
+          </a:fillRef>
+          <a:effectRef idx="0">
+            <a:schemeClr val="accent1"/>
+          </a:effectRef>
+          <a:fontRef idx="minor">
+            <a:schemeClr val="tx1"/>
+          </a:fontRef>
+        </p:style>
+      </p:cxnSp>
+      <p:cxnSp>
+        <p:nvCxnSpPr>
+          <p:cNvPr id="17" name="Straight Arrow Connector 16">
+            <a:extLst>
+              <a:ext uri="{FF2B5EF4-FFF2-40B4-BE49-F238E27FC236}">
+                <a16:creationId xmlns:a16="http://schemas.microsoft.com/office/drawing/2014/main" id="{66E9B395-2DFA-5303-94EB-D290C18090D5}"/>
+              </a:ext>
+            </a:extLst>
+          </p:cNvPr>
+          <p:cNvCxnSpPr>
+            <a:cxnSpLocks/>
+          </p:cNvCxnSpPr>
+          <p:nvPr/>
+        </p:nvCxnSpPr>
+        <p:spPr>
+          <a:xfrm flipH="1">
+            <a:off x="2286000" y="4800285"/>
+            <a:ext cx="7277597" cy="1763479"/>
+          </a:xfrm>
+          <a:prstGeom prst="straightConnector1">
+            <a:avLst/>
+          </a:prstGeom>
+          <a:ln>
+            <a:tailEnd type="triangle"/>
+          </a:ln>
+        </p:spPr>
+        <p:style>
+          <a:lnRef idx="1">
+            <a:schemeClr val="accent1"/>
+          </a:lnRef>
+          <a:fillRef idx="0">
+            <a:schemeClr val="accent1"/>
+          </a:fillRef>
+          <a:effectRef idx="0">
+            <a:schemeClr val="accent1"/>
+          </a:effectRef>
+          <a:fontRef idx="minor">
+            <a:schemeClr val="tx1"/>
+          </a:fontRef>
+        </p:style>
+      </p:cxnSp>
+      <p:sp>
+        <p:nvSpPr>
+          <p:cNvPr id="20" name="TextBox 19">
+            <a:extLst>
+              <a:ext uri="{FF2B5EF4-FFF2-40B4-BE49-F238E27FC236}">
+                <a16:creationId xmlns:a16="http://schemas.microsoft.com/office/drawing/2014/main" id="{E0728DD8-177A-7EF3-F253-7CFAEE171B79}"/>
+              </a:ext>
+            </a:extLst>
+          </p:cNvPr>
+          <p:cNvSpPr txBox="1"/>
+          <p:nvPr/>
+        </p:nvSpPr>
+        <p:spPr>
+          <a:xfrm>
+            <a:off x="9240852" y="2057715"/>
+            <a:ext cx="2391336" cy="707886"/>
+          </a:xfrm>
+          <a:prstGeom prst="rect">
+            <a:avLst/>
+          </a:prstGeom>
+          <a:noFill/>
+        </p:spPr>
+        <p:txBody>
+          <a:bodyPr wrap="square">
+            <a:spAutoFit/>
+          </a:bodyPr>
+          <a:lstStyle/>
+          <a:p>
+            <a:r>
+              <a:rPr lang="en-DE" sz="1000" dirty="0">
+                <a:solidFill>
+                  <a:srgbClr val="00B0F0"/>
+                </a:solidFill>
+              </a:rPr>
+              <a:t>https://paris21-data.github.io/CH_methodology_note/about-the-data.html#paris21---pilot-assessments</a:t>
+            </a:r>
+          </a:p>
+        </p:txBody>
+      </p:sp>
+      <p:cxnSp>
+        <p:nvCxnSpPr>
+          <p:cNvPr id="21" name="Straight Arrow Connector 20">
+            <a:extLst>
+              <a:ext uri="{FF2B5EF4-FFF2-40B4-BE49-F238E27FC236}">
+                <a16:creationId xmlns:a16="http://schemas.microsoft.com/office/drawing/2014/main" id="{E0AB16A7-596F-9F21-26CC-2138F75F6271}"/>
+              </a:ext>
+            </a:extLst>
+          </p:cNvPr>
+          <p:cNvCxnSpPr>
+            <a:cxnSpLocks/>
+          </p:cNvCxnSpPr>
+          <p:nvPr/>
+        </p:nvCxnSpPr>
+        <p:spPr>
+          <a:xfrm flipH="1">
+            <a:off x="8332525" y="2290392"/>
+            <a:ext cx="792652" cy="2698"/>
+          </a:xfrm>
+          <a:prstGeom prst="straightConnector1">
+            <a:avLst/>
+          </a:prstGeom>
+          <a:ln>
+            <a:tailEnd type="triangle"/>
+          </a:ln>
+        </p:spPr>
+        <p:style>
+          <a:lnRef idx="1">
+            <a:schemeClr val="accent1"/>
+          </a:lnRef>
+          <a:fillRef idx="0">
+            <a:schemeClr val="accent1"/>
+          </a:fillRef>
+          <a:effectRef idx="0">
+            <a:schemeClr val="accent1"/>
+          </a:effectRef>
+          <a:fontRef idx="minor">
+            <a:schemeClr val="tx1"/>
+          </a:fontRef>
+        </p:style>
+      </p:cxnSp>
     </p:spTree>
     <p:extLst>
       <p:ext uri="{BB962C8B-B14F-4D97-AF65-F5344CB8AC3E}">
@@ -6455,22 +6892,24 @@
           <a:lstStyle/>
           <a:p>
             <a:r>
-              <a:rPr lang="en-GB"/>
+              <a:rPr lang="en-GB" dirty="0"/>
               <a:t>Source: UNSD, World Bank, and PARIS21 (2021), Cape Town Global Action Plan Monitoring Survey. </a:t>
             </a:r>
             <a:r>
-              <a:rPr lang="en-US"/>
+              <a:rPr lang="en-US" dirty="0"/>
               <a:t>See the </a:t>
             </a:r>
             <a:r>
-              <a:rPr lang="en-US" u="sng"/>
+              <a:rPr lang="en-US" u="sng" dirty="0">
+                <a:hlinkClick r:id="rId3"/>
+              </a:rPr>
               <a:t>methodology note </a:t>
             </a:r>
             <a:r>
-              <a:rPr lang="en-US"/>
+              <a:rPr lang="en-US" dirty="0"/>
               <a:t>for details.</a:t>
             </a:r>
-            <a:endParaRPr lang="en-GB"/>
+            <a:endParaRPr lang="en-GB" dirty="0"/>
           </a:p>
         </p:txBody>
       </p:sp>
@@ -6615,7 +7054,7 @@
             <p:nvPr/>
           </p:nvPicPr>
           <p:blipFill rotWithShape="1">
-            <a:blip r:embed="rId3"/>
+            <a:blip r:embed="rId4"/>
             <a:srcRect r="37744" b="11026"/>
             <a:stretch/>
           </p:blipFill>
@@ -6638,7 +7077,7 @@
             <p:nvPr/>
           </p:nvPicPr>
           <p:blipFill>
-            <a:blip r:embed="rId4" cstate="print">
+            <a:blip r:embed="rId5" cstate="print">
               <a:extLst>
                 <a:ext uri="{28A0092B-C50C-407E-A947-70E740481C1C}">
                   <a14:useLocalDpi xmlns:a14="http://schemas.microsoft.com/office/drawing/2010/main" val="0"/>
@@ -6699,7 +7138,9 @@
               <a:t>See the </a:t>
             </a:r>
             <a:r>
-              <a:rPr lang="en-US" sz="1400" u="sng" dirty="0"/>
+              <a:rPr lang="en-US" sz="1400" u="sng" dirty="0">
+                <a:hlinkClick r:id="rId3"/>
+              </a:rPr>
               <a:t>methodology note </a:t>
             </a:r>
             <a:r>
@@ -6894,7 +7335,7 @@
             <p:nvPr/>
           </p:nvPicPr>
           <p:blipFill rotWithShape="1">
-            <a:blip r:embed="rId3"/>
+            <a:blip r:embed="rId4"/>
             <a:srcRect r="37744" b="11026"/>
             <a:stretch/>
           </p:blipFill>
@@ -6911,802 +7352,6 @@
         <p:pic>
           <p:nvPicPr>
             <p:cNvPr id="27" name="Picture 2" descr="Explain Vector Icons free download in SVG, PNG Format"/>
-            <p:cNvPicPr>
-              <a:picLocks noChangeAspect="1" noChangeArrowheads="1"/>
-            </p:cNvPicPr>
-            <p:nvPr/>
-          </p:nvPicPr>
-          <p:blipFill>
-            <a:blip r:embed="rId4" cstate="print">
-              <a:extLst>
-                <a:ext uri="{28A0092B-C50C-407E-A947-70E740481C1C}">
-                  <a14:useLocalDpi xmlns:a14="http://schemas.microsoft.com/office/drawing/2010/main" val="0"/>
-                </a:ext>
-              </a:extLst>
-            </a:blip>
-            <a:srcRect/>
-            <a:stretch>
-              <a:fillRect/>
-            </a:stretch>
-          </p:blipFill>
-          <p:spPr bwMode="auto">
-            <a:xfrm>
-              <a:off x="2474301" y="5673044"/>
-              <a:ext cx="304435" cy="304435"/>
-            </a:xfrm>
-            <a:prstGeom prst="rect">
-              <a:avLst/>
-            </a:prstGeom>
-            <a:solidFill>
-              <a:schemeClr val="bg1"/>
-            </a:solidFill>
-          </p:spPr>
-        </p:pic>
-      </p:grpSp>
-    </p:spTree>
-    <p:extLst>
-      <p:ext uri="{BB962C8B-B14F-4D97-AF65-F5344CB8AC3E}">
-        <p14:creationId xmlns:p14="http://schemas.microsoft.com/office/powerpoint/2010/main" val="661090305"/>
-      </p:ext>
-    </p:extLst>
-  </p:cSld>
-  <p:clrMapOvr>
-    <a:masterClrMapping/>
-  </p:clrMapOvr>
-</p:sld>
-</file>
-
-<file path=ppt/slides/slide18.xml><?xml version="1.0" encoding="utf-8"?>
-<p:sld xmlns:a="http://schemas.openxmlformats.org/drawingml/2006/main" xmlns:r="http://schemas.openxmlformats.org/officeDocument/2006/relationships" xmlns:p="http://schemas.openxmlformats.org/presentationml/2006/main">
-  <p:cSld>
-    <p:spTree>
-      <p:nvGrpSpPr>
-        <p:cNvPr id="1" name=""/>
-        <p:cNvGrpSpPr/>
-        <p:nvPr/>
-      </p:nvGrpSpPr>
-      <p:grpSpPr>
-        <a:xfrm>
-          <a:off x="0" y="0"/>
-          <a:ext cx="0" cy="0"/>
-          <a:chOff x="0" y="0"/>
-          <a:chExt cx="0" cy="0"/>
-        </a:xfrm>
-      </p:grpSpPr>
-      <p:sp>
-        <p:nvSpPr>
-          <p:cNvPr id="6" name="TextBox 5"/>
-          <p:cNvSpPr txBox="1"/>
-          <p:nvPr/>
-        </p:nvSpPr>
-        <p:spPr>
-          <a:xfrm>
-            <a:off x="142043" y="275208"/>
-            <a:ext cx="1376039" cy="369332"/>
-          </a:xfrm>
-          <a:prstGeom prst="rect">
-            <a:avLst/>
-          </a:prstGeom>
-          <a:noFill/>
-        </p:spPr>
-        <p:txBody>
-          <a:bodyPr wrap="square" rtlCol="0">
-            <a:spAutoFit/>
-          </a:bodyPr>
-          <a:lstStyle/>
-          <a:p>
-            <a:r>
-              <a:rPr lang="en-GB"/>
-              <a:t>RCP 10</a:t>
-            </a:r>
-          </a:p>
-        </p:txBody>
-      </p:sp>
-      <p:pic>
-        <p:nvPicPr>
-          <p:cNvPr id="2" name="Picture 1"/>
-          <p:cNvPicPr>
-            <a:picLocks noChangeAspect="1"/>
-          </p:cNvPicPr>
-          <p:nvPr/>
-        </p:nvPicPr>
-        <p:blipFill>
-          <a:blip r:embed="rId2"/>
-          <a:stretch>
-            <a:fillRect/>
-          </a:stretch>
-        </p:blipFill>
-        <p:spPr>
-          <a:xfrm>
-            <a:off x="1888342" y="1021648"/>
-            <a:ext cx="8848256" cy="1267016"/>
-          </a:xfrm>
-          <a:prstGeom prst="rect">
-            <a:avLst/>
-          </a:prstGeom>
-          <a:ln>
-            <a:solidFill>
-              <a:schemeClr val="tx2"/>
-            </a:solidFill>
-          </a:ln>
-        </p:spPr>
-      </p:pic>
-      <p:sp>
-        <p:nvSpPr>
-          <p:cNvPr id="5" name="Rectangle 4"/>
-          <p:cNvSpPr/>
-          <p:nvPr/>
-        </p:nvSpPr>
-        <p:spPr>
-          <a:xfrm>
-            <a:off x="11061450" y="365231"/>
-            <a:ext cx="589548" cy="558618"/>
-          </a:xfrm>
-          <a:prstGeom prst="rect">
-            <a:avLst/>
-          </a:prstGeom>
-          <a:solidFill>
-            <a:srgbClr val="FF0000"/>
-          </a:solidFill>
-        </p:spPr>
-        <p:style>
-          <a:lnRef idx="2">
-            <a:schemeClr val="accent1">
-              <a:shade val="50000"/>
-            </a:schemeClr>
-          </a:lnRef>
-          <a:fillRef idx="1">
-            <a:schemeClr val="accent1"/>
-          </a:fillRef>
-          <a:effectRef idx="0">
-            <a:schemeClr val="accent1"/>
-          </a:effectRef>
-          <a:fontRef idx="minor">
-            <a:schemeClr val="lt1"/>
-          </a:fontRef>
-        </p:style>
-        <p:txBody>
-          <a:bodyPr rtlCol="0" anchor="ctr"/>
-          <a:lstStyle/>
-          <a:p>
-            <a:pPr algn="ctr"/>
-            <a:r>
-              <a:rPr lang="en-GB"/>
-              <a:t>GEN</a:t>
-            </a:r>
-          </a:p>
-        </p:txBody>
-      </p:sp>
-      <p:sp>
-        <p:nvSpPr>
-          <p:cNvPr id="8" name="Rectangle 7"/>
-          <p:cNvSpPr/>
-          <p:nvPr/>
-        </p:nvSpPr>
-        <p:spPr>
-          <a:xfrm>
-            <a:off x="1888341" y="2462123"/>
-            <a:ext cx="8940079" cy="646331"/>
-          </a:xfrm>
-          <a:prstGeom prst="rect">
-            <a:avLst/>
-          </a:prstGeom>
-          <a:solidFill>
-            <a:schemeClr val="bg1">
-              <a:lumMod val="95000"/>
-            </a:schemeClr>
-          </a:solidFill>
-        </p:spPr>
-        <p:txBody>
-          <a:bodyPr wrap="square" lIns="91440" tIns="45720" rIns="91440" bIns="45720" anchor="t">
-            <a:spAutoFit/>
-          </a:bodyPr>
-          <a:lstStyle/>
-          <a:p>
-            <a:r>
-              <a:rPr lang="en-GB" dirty="0">
-                <a:ea typeface="+mn-lt"/>
-                <a:cs typeface="+mn-lt"/>
-              </a:rPr>
-              <a:t>Source: The country's NSDS and other planning documents. See the methodology note for details. </a:t>
-            </a:r>
-            <a:endParaRPr lang="en-US" dirty="0"/>
-          </a:p>
-        </p:txBody>
-      </p:sp>
-    </p:spTree>
-    <p:extLst>
-      <p:ext uri="{BB962C8B-B14F-4D97-AF65-F5344CB8AC3E}">
-        <p14:creationId xmlns:p14="http://schemas.microsoft.com/office/powerpoint/2010/main" val="2812184993"/>
-      </p:ext>
-    </p:extLst>
-  </p:cSld>
-  <p:clrMapOvr>
-    <a:masterClrMapping/>
-  </p:clrMapOvr>
-</p:sld>
-</file>
-
-<file path=ppt/slides/slide19.xml><?xml version="1.0" encoding="utf-8"?>
-<p:sld xmlns:a="http://schemas.openxmlformats.org/drawingml/2006/main" xmlns:r="http://schemas.openxmlformats.org/officeDocument/2006/relationships" xmlns:p="http://schemas.openxmlformats.org/presentationml/2006/main">
-  <p:cSld>
-    <p:spTree>
-      <p:nvGrpSpPr>
-        <p:cNvPr id="1" name=""/>
-        <p:cNvGrpSpPr/>
-        <p:nvPr/>
-      </p:nvGrpSpPr>
-      <p:grpSpPr>
-        <a:xfrm>
-          <a:off x="0" y="0"/>
-          <a:ext cx="0" cy="0"/>
-          <a:chOff x="0" y="0"/>
-          <a:chExt cx="0" cy="0"/>
-        </a:xfrm>
-      </p:grpSpPr>
-      <p:sp>
-        <p:nvSpPr>
-          <p:cNvPr id="6" name="TextBox 5"/>
-          <p:cNvSpPr txBox="1"/>
-          <p:nvPr/>
-        </p:nvSpPr>
-        <p:spPr>
-          <a:xfrm>
-            <a:off x="142043" y="275208"/>
-            <a:ext cx="1376039" cy="369332"/>
-          </a:xfrm>
-          <a:prstGeom prst="rect">
-            <a:avLst/>
-          </a:prstGeom>
-          <a:noFill/>
-        </p:spPr>
-        <p:txBody>
-          <a:bodyPr wrap="square" rtlCol="0">
-            <a:spAutoFit/>
-          </a:bodyPr>
-          <a:lstStyle/>
-          <a:p>
-            <a:r>
-              <a:rPr lang="en-GB"/>
-              <a:t>RCP 11 - 13</a:t>
-            </a:r>
-          </a:p>
-        </p:txBody>
-      </p:sp>
-      <p:pic>
-        <p:nvPicPr>
-          <p:cNvPr id="3" name="Picture 2"/>
-          <p:cNvPicPr>
-            <a:picLocks noChangeAspect="1"/>
-          </p:cNvPicPr>
-          <p:nvPr/>
-        </p:nvPicPr>
-        <p:blipFill>
-          <a:blip r:embed="rId2"/>
-          <a:stretch>
-            <a:fillRect/>
-          </a:stretch>
-        </p:blipFill>
-        <p:spPr>
-          <a:xfrm>
-            <a:off x="2135542" y="644540"/>
-            <a:ext cx="7867650" cy="2066925"/>
-          </a:xfrm>
-          <a:prstGeom prst="rect">
-            <a:avLst/>
-          </a:prstGeom>
-        </p:spPr>
-      </p:pic>
-      <p:pic>
-        <p:nvPicPr>
-          <p:cNvPr id="4" name="Picture 3"/>
-          <p:cNvPicPr>
-            <a:picLocks noChangeAspect="1"/>
-          </p:cNvPicPr>
-          <p:nvPr/>
-        </p:nvPicPr>
-        <p:blipFill>
-          <a:blip r:embed="rId3"/>
-          <a:stretch>
-            <a:fillRect/>
-          </a:stretch>
-        </p:blipFill>
-        <p:spPr>
-          <a:xfrm>
-            <a:off x="2163455" y="2711465"/>
-            <a:ext cx="7848600" cy="1971675"/>
-          </a:xfrm>
-          <a:prstGeom prst="rect">
-            <a:avLst/>
-          </a:prstGeom>
-        </p:spPr>
-      </p:pic>
-      <p:sp>
-        <p:nvSpPr>
-          <p:cNvPr id="7" name="TextBox 6"/>
-          <p:cNvSpPr txBox="1"/>
-          <p:nvPr/>
-        </p:nvSpPr>
-        <p:spPr>
-          <a:xfrm>
-            <a:off x="1265418" y="275208"/>
-            <a:ext cx="1983107" cy="369332"/>
-          </a:xfrm>
-          <a:prstGeom prst="rect">
-            <a:avLst/>
-          </a:prstGeom>
-          <a:noFill/>
-        </p:spPr>
-        <p:txBody>
-          <a:bodyPr wrap="square" rtlCol="0">
-            <a:spAutoFit/>
-          </a:bodyPr>
-          <a:lstStyle/>
-          <a:p>
-            <a:r>
-              <a:rPr lang="en-GB"/>
-              <a:t>+ RCP 14 - 16</a:t>
-            </a:r>
-          </a:p>
-        </p:txBody>
-      </p:sp>
-      <p:sp>
-        <p:nvSpPr>
-          <p:cNvPr id="9" name="Rectangle 8"/>
-          <p:cNvSpPr/>
-          <p:nvPr/>
-        </p:nvSpPr>
-        <p:spPr>
-          <a:xfrm>
-            <a:off x="9984142" y="644540"/>
-            <a:ext cx="589548" cy="558618"/>
-          </a:xfrm>
-          <a:prstGeom prst="rect">
-            <a:avLst/>
-          </a:prstGeom>
-        </p:spPr>
-        <p:style>
-          <a:lnRef idx="2">
-            <a:schemeClr val="accent1">
-              <a:shade val="50000"/>
-            </a:schemeClr>
-          </a:lnRef>
-          <a:fillRef idx="1">
-            <a:schemeClr val="accent1"/>
-          </a:fillRef>
-          <a:effectRef idx="0">
-            <a:schemeClr val="accent1"/>
-          </a:effectRef>
-          <a:fontRef idx="minor">
-            <a:schemeClr val="lt1"/>
-          </a:fontRef>
-        </p:style>
-        <p:txBody>
-          <a:bodyPr rtlCol="0" anchor="ctr"/>
-          <a:lstStyle/>
-          <a:p>
-            <a:pPr algn="ctr"/>
-            <a:r>
-              <a:rPr lang="en-GB"/>
-              <a:t>A</a:t>
-            </a:r>
-          </a:p>
-        </p:txBody>
-      </p:sp>
-      <p:sp>
-        <p:nvSpPr>
-          <p:cNvPr id="10" name="Rectangle 9"/>
-          <p:cNvSpPr/>
-          <p:nvPr/>
-        </p:nvSpPr>
-        <p:spPr>
-          <a:xfrm>
-            <a:off x="10012055" y="3384195"/>
-            <a:ext cx="589548" cy="558618"/>
-          </a:xfrm>
-          <a:prstGeom prst="rect">
-            <a:avLst/>
-          </a:prstGeom>
-        </p:spPr>
-        <p:style>
-          <a:lnRef idx="2">
-            <a:schemeClr val="accent1">
-              <a:shade val="50000"/>
-            </a:schemeClr>
-          </a:lnRef>
-          <a:fillRef idx="1">
-            <a:schemeClr val="accent1"/>
-          </a:fillRef>
-          <a:effectRef idx="0">
-            <a:schemeClr val="accent1"/>
-          </a:effectRef>
-          <a:fontRef idx="minor">
-            <a:schemeClr val="lt1"/>
-          </a:fontRef>
-        </p:style>
-        <p:txBody>
-          <a:bodyPr rtlCol="0" anchor="ctr"/>
-          <a:lstStyle/>
-          <a:p>
-            <a:pPr algn="ctr"/>
-            <a:r>
-              <a:rPr lang="en-GB"/>
-              <a:t>A</a:t>
-            </a:r>
-          </a:p>
-        </p:txBody>
-      </p:sp>
-      <p:sp>
-        <p:nvSpPr>
-          <p:cNvPr id="11" name="Rectangle 10"/>
-          <p:cNvSpPr/>
-          <p:nvPr/>
-        </p:nvSpPr>
-        <p:spPr>
-          <a:xfrm>
-            <a:off x="2163455" y="4892502"/>
-            <a:ext cx="7848600" cy="646331"/>
-          </a:xfrm>
-          <a:prstGeom prst="rect">
-            <a:avLst/>
-          </a:prstGeom>
-          <a:solidFill>
-            <a:schemeClr val="bg1">
-              <a:lumMod val="95000"/>
-            </a:schemeClr>
-          </a:solidFill>
-        </p:spPr>
-        <p:txBody>
-          <a:bodyPr wrap="square">
-            <a:spAutoFit/>
-          </a:bodyPr>
-          <a:lstStyle/>
-          <a:p>
-            <a:r>
-              <a:rPr lang="en-GB"/>
-              <a:t>Source: UNSD, World Bank, and PARIS21 (2021), Cape Town Global Action Plan Monitoring Survey. </a:t>
-            </a:r>
-            <a:r>
-              <a:rPr lang="en-US"/>
-              <a:t>See the </a:t>
-            </a:r>
-            <a:r>
-              <a:rPr lang="en-US" u="sng"/>
-              <a:t>methodology note </a:t>
-            </a:r>
-            <a:r>
-              <a:rPr lang="en-US"/>
-              <a:t>for details.</a:t>
-            </a:r>
-            <a:endParaRPr lang="en-GB"/>
-          </a:p>
-        </p:txBody>
-      </p:sp>
-    </p:spTree>
-    <p:extLst>
-      <p:ext uri="{BB962C8B-B14F-4D97-AF65-F5344CB8AC3E}">
-        <p14:creationId xmlns:p14="http://schemas.microsoft.com/office/powerpoint/2010/main" val="3737877929"/>
-      </p:ext>
-    </p:extLst>
-  </p:cSld>
-  <p:clrMapOvr>
-    <a:masterClrMapping/>
-  </p:clrMapOvr>
-</p:sld>
-</file>
-
-<file path=ppt/slides/slide2.xml><?xml version="1.0" encoding="utf-8"?>
-<p:sld xmlns:a="http://schemas.openxmlformats.org/drawingml/2006/main" xmlns:r="http://schemas.openxmlformats.org/officeDocument/2006/relationships" xmlns:p="http://schemas.openxmlformats.org/presentationml/2006/main">
-  <p:cSld>
-    <p:spTree>
-      <p:nvGrpSpPr>
-        <p:cNvPr id="1" name=""/>
-        <p:cNvGrpSpPr/>
-        <p:nvPr/>
-      </p:nvGrpSpPr>
-      <p:grpSpPr>
-        <a:xfrm>
-          <a:off x="0" y="0"/>
-          <a:ext cx="0" cy="0"/>
-          <a:chOff x="0" y="0"/>
-          <a:chExt cx="0" cy="0"/>
-        </a:xfrm>
-      </p:grpSpPr>
-      <p:sp>
-        <p:nvSpPr>
-          <p:cNvPr id="6" name="Rectangle 5"/>
-          <p:cNvSpPr/>
-          <p:nvPr/>
-        </p:nvSpPr>
-        <p:spPr>
-          <a:xfrm>
-            <a:off x="2553669" y="4685324"/>
-            <a:ext cx="7266370" cy="354443"/>
-          </a:xfrm>
-          <a:prstGeom prst="rect">
-            <a:avLst/>
-          </a:prstGeom>
-          <a:solidFill>
-            <a:schemeClr val="bg1">
-              <a:lumMod val="95000"/>
-            </a:schemeClr>
-          </a:solidFill>
-          <a:ln>
-            <a:noFill/>
-          </a:ln>
-        </p:spPr>
-        <p:style>
-          <a:lnRef idx="2">
-            <a:schemeClr val="accent1">
-              <a:shade val="50000"/>
-            </a:schemeClr>
-          </a:lnRef>
-          <a:fillRef idx="1">
-            <a:schemeClr val="accent1"/>
-          </a:fillRef>
-          <a:effectRef idx="0">
-            <a:schemeClr val="accent1"/>
-          </a:effectRef>
-          <a:fontRef idx="minor">
-            <a:schemeClr val="lt1"/>
-          </a:fontRef>
-        </p:style>
-        <p:txBody>
-          <a:bodyPr rtlCol="0" anchor="ctr"/>
-          <a:lstStyle/>
-          <a:p>
-            <a:r>
-              <a:rPr lang="en-GB" sz="1200" dirty="0">
-                <a:solidFill>
-                  <a:schemeClr val="bg1">
-                    <a:lumMod val="50000"/>
-                  </a:schemeClr>
-                </a:solidFill>
-              </a:rPr>
-              <a:t>The values are in USD. Source: </a:t>
-            </a:r>
-            <a:r>
-              <a:rPr lang="en-US" sz="1200" dirty="0">
-                <a:solidFill>
-                  <a:schemeClr val="bg1">
-                    <a:lumMod val="50000"/>
-                  </a:schemeClr>
-                </a:solidFill>
-              </a:rPr>
-              <a:t>PARIS21 (2021), Partner Report on Support to Statistics. See the </a:t>
-            </a:r>
-            <a:r>
-              <a:rPr lang="en-US" sz="1200" u="sng" dirty="0">
-                <a:solidFill>
-                  <a:schemeClr val="bg1">
-                    <a:lumMod val="50000"/>
-                  </a:schemeClr>
-                </a:solidFill>
-              </a:rPr>
-              <a:t>methodology note </a:t>
-            </a:r>
-            <a:r>
-              <a:rPr lang="en-US" sz="1200" dirty="0">
-                <a:solidFill>
-                  <a:schemeClr val="bg1">
-                    <a:lumMod val="50000"/>
-                  </a:schemeClr>
-                </a:solidFill>
-              </a:rPr>
-              <a:t>for details.</a:t>
-            </a:r>
-            <a:endParaRPr lang="en-GB" sz="1200" dirty="0">
-              <a:solidFill>
-                <a:schemeClr val="bg1">
-                  <a:lumMod val="50000"/>
-                </a:schemeClr>
-              </a:solidFill>
-            </a:endParaRPr>
-          </a:p>
-        </p:txBody>
-      </p:sp>
-      <p:pic>
-        <p:nvPicPr>
-          <p:cNvPr id="10" name="Content Placeholder 4"/>
-          <p:cNvPicPr>
-            <a:picLocks noChangeAspect="1"/>
-          </p:cNvPicPr>
-          <p:nvPr/>
-        </p:nvPicPr>
-        <p:blipFill rotWithShape="1">
-          <a:blip r:embed="rId2"/>
-          <a:srcRect t="6" b="-1"/>
-          <a:stretch/>
-        </p:blipFill>
-        <p:spPr>
-          <a:xfrm>
-            <a:off x="2553669" y="184122"/>
-            <a:ext cx="7266370" cy="4351093"/>
-          </a:xfrm>
-          <a:prstGeom prst="rect">
-            <a:avLst/>
-          </a:prstGeom>
-        </p:spPr>
-      </p:pic>
-      <p:sp>
-        <p:nvSpPr>
-          <p:cNvPr id="13" name="Rectangle 12"/>
-          <p:cNvSpPr/>
-          <p:nvPr/>
-        </p:nvSpPr>
-        <p:spPr>
-          <a:xfrm>
-            <a:off x="3405553" y="5673044"/>
-            <a:ext cx="6414486" cy="771890"/>
-          </a:xfrm>
-          <a:prstGeom prst="rect">
-            <a:avLst/>
-          </a:prstGeom>
-          <a:noFill/>
-          <a:ln>
-            <a:solidFill>
-              <a:schemeClr val="tx1"/>
-            </a:solidFill>
-          </a:ln>
-        </p:spPr>
-        <p:style>
-          <a:lnRef idx="2">
-            <a:schemeClr val="accent1">
-              <a:shade val="50000"/>
-            </a:schemeClr>
-          </a:lnRef>
-          <a:fillRef idx="1">
-            <a:schemeClr val="accent1"/>
-          </a:fillRef>
-          <a:effectRef idx="0">
-            <a:schemeClr val="accent1"/>
-          </a:effectRef>
-          <a:fontRef idx="minor">
-            <a:schemeClr val="lt1"/>
-          </a:fontRef>
-        </p:style>
-        <p:txBody>
-          <a:bodyPr rtlCol="0" anchor="ctr"/>
-          <a:lstStyle/>
-          <a:p>
-            <a:r>
-              <a:rPr lang="en-US" sz="1200" dirty="0">
-                <a:solidFill>
-                  <a:schemeClr val="tx1"/>
-                </a:solidFill>
-              </a:rPr>
-              <a:t>This map shows funding flows (</a:t>
-            </a:r>
-            <a:r>
-              <a:rPr lang="en-US" sz="1200" dirty="0">
-                <a:solidFill>
-                  <a:schemeClr val="tx1"/>
-                </a:solidFill>
-                <a:hlinkClick r:id="rId3"/>
-              </a:rPr>
-              <a:t>commitments or disbursements</a:t>
-            </a:r>
-            <a:r>
-              <a:rPr lang="en-US" sz="1200" dirty="0">
-                <a:solidFill>
-                  <a:schemeClr val="tx1"/>
-                </a:solidFill>
-              </a:rPr>
-              <a:t>) to data &amp; statistics to recipients grouped by quantiles. Click on a recipient to see the total amount and its breakdown by providers. </a:t>
-            </a:r>
-          </a:p>
-        </p:txBody>
-      </p:sp>
-      <p:cxnSp>
-        <p:nvCxnSpPr>
-          <p:cNvPr id="15" name="Straight Connector 14"/>
-          <p:cNvCxnSpPr/>
-          <p:nvPr/>
-        </p:nvCxnSpPr>
-        <p:spPr>
-          <a:xfrm flipH="1">
-            <a:off x="9591439" y="5740282"/>
-            <a:ext cx="140677" cy="150568"/>
-          </a:xfrm>
-          <a:prstGeom prst="line">
-            <a:avLst/>
-          </a:prstGeom>
-          <a:ln>
-            <a:solidFill>
-              <a:schemeClr val="tx1"/>
-            </a:solidFill>
-          </a:ln>
-        </p:spPr>
-        <p:style>
-          <a:lnRef idx="1">
-            <a:schemeClr val="accent1"/>
-          </a:lnRef>
-          <a:fillRef idx="0">
-            <a:schemeClr val="accent1"/>
-          </a:fillRef>
-          <a:effectRef idx="0">
-            <a:schemeClr val="accent1"/>
-          </a:effectRef>
-          <a:fontRef idx="minor">
-            <a:schemeClr val="tx1"/>
-          </a:fontRef>
-        </p:style>
-      </p:cxnSp>
-      <p:cxnSp>
-        <p:nvCxnSpPr>
-          <p:cNvPr id="17" name="Straight Connector 16"/>
-          <p:cNvCxnSpPr/>
-          <p:nvPr/>
-        </p:nvCxnSpPr>
-        <p:spPr>
-          <a:xfrm>
-            <a:off x="9582646" y="5740282"/>
-            <a:ext cx="167054" cy="159360"/>
-          </a:xfrm>
-          <a:prstGeom prst="line">
-            <a:avLst/>
-          </a:prstGeom>
-          <a:ln>
-            <a:solidFill>
-              <a:schemeClr val="tx1"/>
-            </a:solidFill>
-          </a:ln>
-        </p:spPr>
-        <p:style>
-          <a:lnRef idx="1">
-            <a:schemeClr val="accent1"/>
-          </a:lnRef>
-          <a:fillRef idx="0">
-            <a:schemeClr val="accent1"/>
-          </a:fillRef>
-          <a:effectRef idx="0">
-            <a:schemeClr val="accent1"/>
-          </a:effectRef>
-          <a:fontRef idx="minor">
-            <a:schemeClr val="tx1"/>
-          </a:fontRef>
-        </p:style>
-      </p:cxnSp>
-      <p:grpSp>
-        <p:nvGrpSpPr>
-          <p:cNvPr id="18" name="Group 17"/>
-          <p:cNvGrpSpPr/>
-          <p:nvPr/>
-        </p:nvGrpSpPr>
-        <p:grpSpPr>
-          <a:xfrm>
-            <a:off x="2474301" y="5673044"/>
-            <a:ext cx="699722" cy="304435"/>
-            <a:chOff x="2474301" y="5673044"/>
-            <a:chExt cx="699722" cy="304435"/>
-          </a:xfrm>
-        </p:grpSpPr>
-        <p:pic>
-          <p:nvPicPr>
-            <p:cNvPr id="11" name="Picture 10"/>
-            <p:cNvPicPr>
-              <a:picLocks noChangeAspect="1"/>
-            </p:cNvPicPr>
-            <p:nvPr/>
-          </p:nvPicPr>
-          <p:blipFill rotWithShape="1">
-            <a:blip r:embed="rId4"/>
-            <a:srcRect r="37744" b="11026"/>
-            <a:stretch/>
-          </p:blipFill>
-          <p:spPr>
-            <a:xfrm>
-              <a:off x="2474301" y="5673044"/>
-              <a:ext cx="699722" cy="288142"/>
-            </a:xfrm>
-            <a:prstGeom prst="rect">
-              <a:avLst/>
-            </a:prstGeom>
-          </p:spPr>
-        </p:pic>
-        <p:pic>
-          <p:nvPicPr>
-            <p:cNvPr id="1026" name="Picture 2" descr="Explain Vector Icons free download in SVG, PNG Format"/>
             <p:cNvPicPr>
               <a:picLocks noChangeAspect="1" noChangeArrowheads="1"/>
             </p:cNvPicPr>
@@ -7741,6 +7386,947 @@
       </p:grpSp>
       <p:sp>
         <p:nvSpPr>
+          <p:cNvPr id="2" name="TextBox 1">
+            <a:extLst>
+              <a:ext uri="{FF2B5EF4-FFF2-40B4-BE49-F238E27FC236}">
+                <a16:creationId xmlns:a16="http://schemas.microsoft.com/office/drawing/2014/main" id="{489F2E9C-9D8B-5F0D-6E71-3D03DEB64E34}"/>
+              </a:ext>
+            </a:extLst>
+          </p:cNvPr>
+          <p:cNvSpPr txBox="1"/>
+          <p:nvPr/>
+        </p:nvSpPr>
+        <p:spPr>
+          <a:xfrm>
+            <a:off x="5581896" y="3598371"/>
+            <a:ext cx="1915091" cy="1015663"/>
+          </a:xfrm>
+          <a:prstGeom prst="rect">
+            <a:avLst/>
+          </a:prstGeom>
+          <a:noFill/>
+        </p:spPr>
+        <p:txBody>
+          <a:bodyPr wrap="square" rtlCol="0">
+            <a:spAutoFit/>
+          </a:bodyPr>
+          <a:lstStyle/>
+          <a:p>
+            <a:r>
+              <a:rPr lang="en-US" sz="1000" dirty="0">
+                <a:solidFill>
+                  <a:srgbClr val="00B0F0"/>
+                </a:solidFill>
+              </a:rPr>
+              <a:t>https://paris21-data.github.io/CH_methodology_note/about-the-data.html#unsd-world-bank-paris21-cape-town-global-action-plan-implementation-survey</a:t>
+            </a:r>
+            <a:endParaRPr lang="en-DE" sz="1000" dirty="0">
+              <a:solidFill>
+                <a:srgbClr val="00B0F0"/>
+              </a:solidFill>
+            </a:endParaRPr>
+          </a:p>
+        </p:txBody>
+      </p:sp>
+    </p:spTree>
+    <p:extLst>
+      <p:ext uri="{BB962C8B-B14F-4D97-AF65-F5344CB8AC3E}">
+        <p14:creationId xmlns:p14="http://schemas.microsoft.com/office/powerpoint/2010/main" val="661090305"/>
+      </p:ext>
+    </p:extLst>
+  </p:cSld>
+  <p:clrMapOvr>
+    <a:masterClrMapping/>
+  </p:clrMapOvr>
+</p:sld>
+</file>
+
+<file path=ppt/slides/slide18.xml><?xml version="1.0" encoding="utf-8"?>
+<p:sld xmlns:a="http://schemas.openxmlformats.org/drawingml/2006/main" xmlns:r="http://schemas.openxmlformats.org/officeDocument/2006/relationships" xmlns:p="http://schemas.openxmlformats.org/presentationml/2006/main">
+  <p:cSld>
+    <p:spTree>
+      <p:nvGrpSpPr>
+        <p:cNvPr id="1" name=""/>
+        <p:cNvGrpSpPr/>
+        <p:nvPr/>
+      </p:nvGrpSpPr>
+      <p:grpSpPr>
+        <a:xfrm>
+          <a:off x="0" y="0"/>
+          <a:ext cx="0" cy="0"/>
+          <a:chOff x="0" y="0"/>
+          <a:chExt cx="0" cy="0"/>
+        </a:xfrm>
+      </p:grpSpPr>
+      <p:sp>
+        <p:nvSpPr>
+          <p:cNvPr id="6" name="TextBox 5"/>
+          <p:cNvSpPr txBox="1"/>
+          <p:nvPr/>
+        </p:nvSpPr>
+        <p:spPr>
+          <a:xfrm>
+            <a:off x="142043" y="275208"/>
+            <a:ext cx="1376039" cy="369332"/>
+          </a:xfrm>
+          <a:prstGeom prst="rect">
+            <a:avLst/>
+          </a:prstGeom>
+          <a:noFill/>
+        </p:spPr>
+        <p:txBody>
+          <a:bodyPr wrap="square" rtlCol="0">
+            <a:spAutoFit/>
+          </a:bodyPr>
+          <a:lstStyle/>
+          <a:p>
+            <a:r>
+              <a:rPr lang="en-GB"/>
+              <a:t>RCP 10</a:t>
+            </a:r>
+          </a:p>
+        </p:txBody>
+      </p:sp>
+      <p:pic>
+        <p:nvPicPr>
+          <p:cNvPr id="2" name="Picture 1"/>
+          <p:cNvPicPr>
+            <a:picLocks noChangeAspect="1"/>
+          </p:cNvPicPr>
+          <p:nvPr/>
+        </p:nvPicPr>
+        <p:blipFill>
+          <a:blip r:embed="rId2"/>
+          <a:stretch>
+            <a:fillRect/>
+          </a:stretch>
+        </p:blipFill>
+        <p:spPr>
+          <a:xfrm>
+            <a:off x="1888342" y="1021648"/>
+            <a:ext cx="8848256" cy="1267016"/>
+          </a:xfrm>
+          <a:prstGeom prst="rect">
+            <a:avLst/>
+          </a:prstGeom>
+          <a:ln>
+            <a:solidFill>
+              <a:schemeClr val="tx2"/>
+            </a:solidFill>
+          </a:ln>
+        </p:spPr>
+      </p:pic>
+      <p:sp>
+        <p:nvSpPr>
+          <p:cNvPr id="5" name="Rectangle 4"/>
+          <p:cNvSpPr/>
+          <p:nvPr/>
+        </p:nvSpPr>
+        <p:spPr>
+          <a:xfrm>
+            <a:off x="11061450" y="365231"/>
+            <a:ext cx="589548" cy="558618"/>
+          </a:xfrm>
+          <a:prstGeom prst="rect">
+            <a:avLst/>
+          </a:prstGeom>
+          <a:solidFill>
+            <a:srgbClr val="FF0000"/>
+          </a:solidFill>
+        </p:spPr>
+        <p:style>
+          <a:lnRef idx="2">
+            <a:schemeClr val="accent1">
+              <a:shade val="50000"/>
+            </a:schemeClr>
+          </a:lnRef>
+          <a:fillRef idx="1">
+            <a:schemeClr val="accent1"/>
+          </a:fillRef>
+          <a:effectRef idx="0">
+            <a:schemeClr val="accent1"/>
+          </a:effectRef>
+          <a:fontRef idx="minor">
+            <a:schemeClr val="lt1"/>
+          </a:fontRef>
+        </p:style>
+        <p:txBody>
+          <a:bodyPr rtlCol="0" anchor="ctr"/>
+          <a:lstStyle/>
+          <a:p>
+            <a:pPr algn="ctr"/>
+            <a:r>
+              <a:rPr lang="en-GB"/>
+              <a:t>GEN</a:t>
+            </a:r>
+          </a:p>
+        </p:txBody>
+      </p:sp>
+      <p:sp>
+        <p:nvSpPr>
+          <p:cNvPr id="8" name="Rectangle 7"/>
+          <p:cNvSpPr/>
+          <p:nvPr/>
+        </p:nvSpPr>
+        <p:spPr>
+          <a:xfrm>
+            <a:off x="1888341" y="2462123"/>
+            <a:ext cx="8940079" cy="646331"/>
+          </a:xfrm>
+          <a:prstGeom prst="rect">
+            <a:avLst/>
+          </a:prstGeom>
+          <a:solidFill>
+            <a:schemeClr val="bg1">
+              <a:lumMod val="95000"/>
+            </a:schemeClr>
+          </a:solidFill>
+        </p:spPr>
+        <p:txBody>
+          <a:bodyPr wrap="square" lIns="91440" tIns="45720" rIns="91440" bIns="45720" anchor="t">
+            <a:spAutoFit/>
+          </a:bodyPr>
+          <a:lstStyle/>
+          <a:p>
+            <a:r>
+              <a:rPr lang="en-GB" dirty="0">
+                <a:ea typeface="+mn-lt"/>
+                <a:cs typeface="+mn-lt"/>
+              </a:rPr>
+              <a:t>Source: The country's NSDS and other planning documents. See the </a:t>
+            </a:r>
+            <a:r>
+              <a:rPr lang="en-GB" dirty="0">
+                <a:ea typeface="+mn-lt"/>
+                <a:cs typeface="+mn-lt"/>
+                <a:hlinkClick r:id="rId3"/>
+              </a:rPr>
+              <a:t>methodology note</a:t>
+            </a:r>
+            <a:r>
+              <a:rPr lang="en-GB" dirty="0">
+                <a:ea typeface="+mn-lt"/>
+                <a:cs typeface="+mn-lt"/>
+              </a:rPr>
+              <a:t> for details. </a:t>
+            </a:r>
+            <a:endParaRPr lang="en-US" dirty="0"/>
+          </a:p>
+        </p:txBody>
+      </p:sp>
+      <p:sp>
+        <p:nvSpPr>
+          <p:cNvPr id="3" name="TextBox 2">
+            <a:extLst>
+              <a:ext uri="{FF2B5EF4-FFF2-40B4-BE49-F238E27FC236}">
+                <a16:creationId xmlns:a16="http://schemas.microsoft.com/office/drawing/2014/main" id="{8C484849-0EF8-1AA3-C267-99C7C26CC971}"/>
+              </a:ext>
+            </a:extLst>
+          </p:cNvPr>
+          <p:cNvSpPr txBox="1"/>
+          <p:nvPr/>
+        </p:nvSpPr>
+        <p:spPr>
+          <a:xfrm>
+            <a:off x="7017604" y="3281913"/>
+            <a:ext cx="2391336" cy="707886"/>
+          </a:xfrm>
+          <a:prstGeom prst="rect">
+            <a:avLst/>
+          </a:prstGeom>
+          <a:noFill/>
+        </p:spPr>
+        <p:txBody>
+          <a:bodyPr wrap="square">
+            <a:spAutoFit/>
+          </a:bodyPr>
+          <a:lstStyle/>
+          <a:p>
+            <a:r>
+              <a:rPr lang="en-DE" sz="1000" dirty="0">
+                <a:solidFill>
+                  <a:srgbClr val="00B0F0"/>
+                </a:solidFill>
+              </a:rPr>
+              <a:t>https://paris21-data.github.io/CH_methodology_note/about-the-data.html#paris21---pilot-assessments</a:t>
+            </a:r>
+          </a:p>
+        </p:txBody>
+      </p:sp>
+    </p:spTree>
+    <p:extLst>
+      <p:ext uri="{BB962C8B-B14F-4D97-AF65-F5344CB8AC3E}">
+        <p14:creationId xmlns:p14="http://schemas.microsoft.com/office/powerpoint/2010/main" val="2812184993"/>
+      </p:ext>
+    </p:extLst>
+  </p:cSld>
+  <p:clrMapOvr>
+    <a:masterClrMapping/>
+  </p:clrMapOvr>
+</p:sld>
+</file>
+
+<file path=ppt/slides/slide19.xml><?xml version="1.0" encoding="utf-8"?>
+<p:sld xmlns:a="http://schemas.openxmlformats.org/drawingml/2006/main" xmlns:r="http://schemas.openxmlformats.org/officeDocument/2006/relationships" xmlns:p="http://schemas.openxmlformats.org/presentationml/2006/main">
+  <p:cSld>
+    <p:spTree>
+      <p:nvGrpSpPr>
+        <p:cNvPr id="1" name=""/>
+        <p:cNvGrpSpPr/>
+        <p:nvPr/>
+      </p:nvGrpSpPr>
+      <p:grpSpPr>
+        <a:xfrm>
+          <a:off x="0" y="0"/>
+          <a:ext cx="0" cy="0"/>
+          <a:chOff x="0" y="0"/>
+          <a:chExt cx="0" cy="0"/>
+        </a:xfrm>
+      </p:grpSpPr>
+      <p:sp>
+        <p:nvSpPr>
+          <p:cNvPr id="6" name="TextBox 5"/>
+          <p:cNvSpPr txBox="1"/>
+          <p:nvPr/>
+        </p:nvSpPr>
+        <p:spPr>
+          <a:xfrm>
+            <a:off x="142043" y="275208"/>
+            <a:ext cx="1376039" cy="369332"/>
+          </a:xfrm>
+          <a:prstGeom prst="rect">
+            <a:avLst/>
+          </a:prstGeom>
+          <a:noFill/>
+        </p:spPr>
+        <p:txBody>
+          <a:bodyPr wrap="square" rtlCol="0">
+            <a:spAutoFit/>
+          </a:bodyPr>
+          <a:lstStyle/>
+          <a:p>
+            <a:r>
+              <a:rPr lang="en-GB"/>
+              <a:t>RCP 11 - 13</a:t>
+            </a:r>
+          </a:p>
+        </p:txBody>
+      </p:sp>
+      <p:pic>
+        <p:nvPicPr>
+          <p:cNvPr id="3" name="Picture 2"/>
+          <p:cNvPicPr>
+            <a:picLocks noChangeAspect="1"/>
+          </p:cNvPicPr>
+          <p:nvPr/>
+        </p:nvPicPr>
+        <p:blipFill>
+          <a:blip r:embed="rId2"/>
+          <a:stretch>
+            <a:fillRect/>
+          </a:stretch>
+        </p:blipFill>
+        <p:spPr>
+          <a:xfrm>
+            <a:off x="2135542" y="644540"/>
+            <a:ext cx="7867650" cy="2066925"/>
+          </a:xfrm>
+          <a:prstGeom prst="rect">
+            <a:avLst/>
+          </a:prstGeom>
+        </p:spPr>
+      </p:pic>
+      <p:pic>
+        <p:nvPicPr>
+          <p:cNvPr id="4" name="Picture 3"/>
+          <p:cNvPicPr>
+            <a:picLocks noChangeAspect="1"/>
+          </p:cNvPicPr>
+          <p:nvPr/>
+        </p:nvPicPr>
+        <p:blipFill>
+          <a:blip r:embed="rId3"/>
+          <a:stretch>
+            <a:fillRect/>
+          </a:stretch>
+        </p:blipFill>
+        <p:spPr>
+          <a:xfrm>
+            <a:off x="2163455" y="2711465"/>
+            <a:ext cx="7848600" cy="1971675"/>
+          </a:xfrm>
+          <a:prstGeom prst="rect">
+            <a:avLst/>
+          </a:prstGeom>
+        </p:spPr>
+      </p:pic>
+      <p:sp>
+        <p:nvSpPr>
+          <p:cNvPr id="7" name="TextBox 6"/>
+          <p:cNvSpPr txBox="1"/>
+          <p:nvPr/>
+        </p:nvSpPr>
+        <p:spPr>
+          <a:xfrm>
+            <a:off x="1265418" y="275208"/>
+            <a:ext cx="1983107" cy="369332"/>
+          </a:xfrm>
+          <a:prstGeom prst="rect">
+            <a:avLst/>
+          </a:prstGeom>
+          <a:noFill/>
+        </p:spPr>
+        <p:txBody>
+          <a:bodyPr wrap="square" rtlCol="0">
+            <a:spAutoFit/>
+          </a:bodyPr>
+          <a:lstStyle/>
+          <a:p>
+            <a:r>
+              <a:rPr lang="en-GB"/>
+              <a:t>+ RCP 14 - 16</a:t>
+            </a:r>
+          </a:p>
+        </p:txBody>
+      </p:sp>
+      <p:sp>
+        <p:nvSpPr>
+          <p:cNvPr id="9" name="Rectangle 8"/>
+          <p:cNvSpPr/>
+          <p:nvPr/>
+        </p:nvSpPr>
+        <p:spPr>
+          <a:xfrm>
+            <a:off x="9984142" y="644540"/>
+            <a:ext cx="589548" cy="558618"/>
+          </a:xfrm>
+          <a:prstGeom prst="rect">
+            <a:avLst/>
+          </a:prstGeom>
+        </p:spPr>
+        <p:style>
+          <a:lnRef idx="2">
+            <a:schemeClr val="accent1">
+              <a:shade val="50000"/>
+            </a:schemeClr>
+          </a:lnRef>
+          <a:fillRef idx="1">
+            <a:schemeClr val="accent1"/>
+          </a:fillRef>
+          <a:effectRef idx="0">
+            <a:schemeClr val="accent1"/>
+          </a:effectRef>
+          <a:fontRef idx="minor">
+            <a:schemeClr val="lt1"/>
+          </a:fontRef>
+        </p:style>
+        <p:txBody>
+          <a:bodyPr rtlCol="0" anchor="ctr"/>
+          <a:lstStyle/>
+          <a:p>
+            <a:pPr algn="ctr"/>
+            <a:r>
+              <a:rPr lang="en-GB"/>
+              <a:t>A</a:t>
+            </a:r>
+          </a:p>
+        </p:txBody>
+      </p:sp>
+      <p:sp>
+        <p:nvSpPr>
+          <p:cNvPr id="10" name="Rectangle 9"/>
+          <p:cNvSpPr/>
+          <p:nvPr/>
+        </p:nvSpPr>
+        <p:spPr>
+          <a:xfrm>
+            <a:off x="10012055" y="3384195"/>
+            <a:ext cx="589548" cy="558618"/>
+          </a:xfrm>
+          <a:prstGeom prst="rect">
+            <a:avLst/>
+          </a:prstGeom>
+        </p:spPr>
+        <p:style>
+          <a:lnRef idx="2">
+            <a:schemeClr val="accent1">
+              <a:shade val="50000"/>
+            </a:schemeClr>
+          </a:lnRef>
+          <a:fillRef idx="1">
+            <a:schemeClr val="accent1"/>
+          </a:fillRef>
+          <a:effectRef idx="0">
+            <a:schemeClr val="accent1"/>
+          </a:effectRef>
+          <a:fontRef idx="minor">
+            <a:schemeClr val="lt1"/>
+          </a:fontRef>
+        </p:style>
+        <p:txBody>
+          <a:bodyPr rtlCol="0" anchor="ctr"/>
+          <a:lstStyle/>
+          <a:p>
+            <a:pPr algn="ctr"/>
+            <a:r>
+              <a:rPr lang="en-GB"/>
+              <a:t>A</a:t>
+            </a:r>
+          </a:p>
+        </p:txBody>
+      </p:sp>
+      <p:sp>
+        <p:nvSpPr>
+          <p:cNvPr id="11" name="Rectangle 10"/>
+          <p:cNvSpPr/>
+          <p:nvPr/>
+        </p:nvSpPr>
+        <p:spPr>
+          <a:xfrm>
+            <a:off x="2163455" y="4892502"/>
+            <a:ext cx="7848600" cy="646331"/>
+          </a:xfrm>
+          <a:prstGeom prst="rect">
+            <a:avLst/>
+          </a:prstGeom>
+          <a:solidFill>
+            <a:schemeClr val="bg1">
+              <a:lumMod val="95000"/>
+            </a:schemeClr>
+          </a:solidFill>
+        </p:spPr>
+        <p:txBody>
+          <a:bodyPr wrap="square">
+            <a:spAutoFit/>
+          </a:bodyPr>
+          <a:lstStyle/>
+          <a:p>
+            <a:r>
+              <a:rPr lang="en-GB" dirty="0"/>
+              <a:t>Source: UNSD, World Bank, and PARIS21 (2021), Cape Town Global Action Plan Monitoring Survey. </a:t>
+            </a:r>
+            <a:r>
+              <a:rPr lang="en-US" dirty="0"/>
+              <a:t>See the </a:t>
+            </a:r>
+            <a:r>
+              <a:rPr lang="en-US" u="sng" dirty="0">
+                <a:hlinkClick r:id="rId4"/>
+              </a:rPr>
+              <a:t>methodology note </a:t>
+            </a:r>
+            <a:r>
+              <a:rPr lang="en-US" dirty="0"/>
+              <a:t>for details.</a:t>
+            </a:r>
+            <a:endParaRPr lang="en-GB" dirty="0"/>
+          </a:p>
+        </p:txBody>
+      </p:sp>
+      <p:sp>
+        <p:nvSpPr>
+          <p:cNvPr id="2" name="TextBox 1">
+            <a:extLst>
+              <a:ext uri="{FF2B5EF4-FFF2-40B4-BE49-F238E27FC236}">
+                <a16:creationId xmlns:a16="http://schemas.microsoft.com/office/drawing/2014/main" id="{A386F7EB-AF50-222C-1640-8CBE74B481BE}"/>
+              </a:ext>
+            </a:extLst>
+          </p:cNvPr>
+          <p:cNvSpPr txBox="1"/>
+          <p:nvPr/>
+        </p:nvSpPr>
+        <p:spPr>
+          <a:xfrm>
+            <a:off x="4786509" y="5705628"/>
+            <a:ext cx="1915091" cy="1015663"/>
+          </a:xfrm>
+          <a:prstGeom prst="rect">
+            <a:avLst/>
+          </a:prstGeom>
+          <a:noFill/>
+        </p:spPr>
+        <p:txBody>
+          <a:bodyPr wrap="square" rtlCol="0">
+            <a:spAutoFit/>
+          </a:bodyPr>
+          <a:lstStyle/>
+          <a:p>
+            <a:r>
+              <a:rPr lang="en-US" sz="1000" dirty="0">
+                <a:solidFill>
+                  <a:srgbClr val="00B0F0"/>
+                </a:solidFill>
+              </a:rPr>
+              <a:t>https://paris21-data.github.io/CH_methodology_note/about-the-data.html#unsd-world-bank-paris21-cape-town-global-action-plan-implementation-survey</a:t>
+            </a:r>
+            <a:endParaRPr lang="en-DE" sz="1000" dirty="0">
+              <a:solidFill>
+                <a:srgbClr val="00B0F0"/>
+              </a:solidFill>
+            </a:endParaRPr>
+          </a:p>
+        </p:txBody>
+      </p:sp>
+    </p:spTree>
+    <p:extLst>
+      <p:ext uri="{BB962C8B-B14F-4D97-AF65-F5344CB8AC3E}">
+        <p14:creationId xmlns:p14="http://schemas.microsoft.com/office/powerpoint/2010/main" val="3737877929"/>
+      </p:ext>
+    </p:extLst>
+  </p:cSld>
+  <p:clrMapOvr>
+    <a:masterClrMapping/>
+  </p:clrMapOvr>
+</p:sld>
+</file>
+
+<file path=ppt/slides/slide2.xml><?xml version="1.0" encoding="utf-8"?>
+<p:sld xmlns:a="http://schemas.openxmlformats.org/drawingml/2006/main" xmlns:r="http://schemas.openxmlformats.org/officeDocument/2006/relationships" xmlns:p="http://schemas.openxmlformats.org/presentationml/2006/main">
+  <p:cSld>
+    <p:spTree>
+      <p:nvGrpSpPr>
+        <p:cNvPr id="1" name=""/>
+        <p:cNvGrpSpPr/>
+        <p:nvPr/>
+      </p:nvGrpSpPr>
+      <p:grpSpPr>
+        <a:xfrm>
+          <a:off x="0" y="0"/>
+          <a:ext cx="0" cy="0"/>
+          <a:chOff x="0" y="0"/>
+          <a:chExt cx="0" cy="0"/>
+        </a:xfrm>
+      </p:grpSpPr>
+      <p:sp>
+        <p:nvSpPr>
+          <p:cNvPr id="6" name="Rectangle 5"/>
+          <p:cNvSpPr/>
+          <p:nvPr/>
+        </p:nvSpPr>
+        <p:spPr>
+          <a:xfrm>
+            <a:off x="2553669" y="4685324"/>
+            <a:ext cx="7266370" cy="354443"/>
+          </a:xfrm>
+          <a:prstGeom prst="rect">
+            <a:avLst/>
+          </a:prstGeom>
+          <a:solidFill>
+            <a:schemeClr val="bg1">
+              <a:lumMod val="95000"/>
+            </a:schemeClr>
+          </a:solidFill>
+          <a:ln>
+            <a:noFill/>
+          </a:ln>
+        </p:spPr>
+        <p:style>
+          <a:lnRef idx="2">
+            <a:schemeClr val="accent1">
+              <a:shade val="50000"/>
+            </a:schemeClr>
+          </a:lnRef>
+          <a:fillRef idx="1">
+            <a:schemeClr val="accent1"/>
+          </a:fillRef>
+          <a:effectRef idx="0">
+            <a:schemeClr val="accent1"/>
+          </a:effectRef>
+          <a:fontRef idx="minor">
+            <a:schemeClr val="lt1"/>
+          </a:fontRef>
+        </p:style>
+        <p:txBody>
+          <a:bodyPr rtlCol="0" anchor="ctr"/>
+          <a:lstStyle/>
+          <a:p>
+            <a:r>
+              <a:rPr lang="en-GB" sz="1200" dirty="0">
+                <a:solidFill>
+                  <a:schemeClr val="bg1">
+                    <a:lumMod val="50000"/>
+                  </a:schemeClr>
+                </a:solidFill>
+              </a:rPr>
+              <a:t>The values are in USD. Source: </a:t>
+            </a:r>
+            <a:r>
+              <a:rPr lang="en-US" sz="1200" dirty="0">
+                <a:solidFill>
+                  <a:schemeClr val="bg1">
+                    <a:lumMod val="50000"/>
+                  </a:schemeClr>
+                </a:solidFill>
+              </a:rPr>
+              <a:t>PARIS21 (2021), Partner Report on Support to Statistics. See the </a:t>
+            </a:r>
+            <a:r>
+              <a:rPr lang="en-US" sz="1200" u="sng" dirty="0">
+                <a:solidFill>
+                  <a:schemeClr val="bg1">
+                    <a:lumMod val="50000"/>
+                  </a:schemeClr>
+                </a:solidFill>
+                <a:hlinkClick r:id="rId2"/>
+              </a:rPr>
+              <a:t>methodology note </a:t>
+            </a:r>
+            <a:r>
+              <a:rPr lang="en-US" sz="1200" dirty="0">
+                <a:solidFill>
+                  <a:schemeClr val="bg1">
+                    <a:lumMod val="50000"/>
+                  </a:schemeClr>
+                </a:solidFill>
+              </a:rPr>
+              <a:t>for details.</a:t>
+            </a:r>
+            <a:endParaRPr lang="en-GB" sz="1200" dirty="0">
+              <a:solidFill>
+                <a:schemeClr val="bg1">
+                  <a:lumMod val="50000"/>
+                </a:schemeClr>
+              </a:solidFill>
+            </a:endParaRPr>
+          </a:p>
+        </p:txBody>
+      </p:sp>
+      <p:pic>
+        <p:nvPicPr>
+          <p:cNvPr id="10" name="Content Placeholder 4"/>
+          <p:cNvPicPr>
+            <a:picLocks noChangeAspect="1"/>
+          </p:cNvPicPr>
+          <p:nvPr/>
+        </p:nvPicPr>
+        <p:blipFill rotWithShape="1">
+          <a:blip r:embed="rId3"/>
+          <a:srcRect t="6" b="-1"/>
+          <a:stretch/>
+        </p:blipFill>
+        <p:spPr>
+          <a:xfrm>
+            <a:off x="2553669" y="184122"/>
+            <a:ext cx="7266370" cy="4351093"/>
+          </a:xfrm>
+          <a:prstGeom prst="rect">
+            <a:avLst/>
+          </a:prstGeom>
+        </p:spPr>
+      </p:pic>
+      <p:sp>
+        <p:nvSpPr>
+          <p:cNvPr id="13" name="Rectangle 12"/>
+          <p:cNvSpPr/>
+          <p:nvPr/>
+        </p:nvSpPr>
+        <p:spPr>
+          <a:xfrm>
+            <a:off x="3405553" y="5673044"/>
+            <a:ext cx="6414486" cy="771890"/>
+          </a:xfrm>
+          <a:prstGeom prst="rect">
+            <a:avLst/>
+          </a:prstGeom>
+          <a:noFill/>
+          <a:ln>
+            <a:solidFill>
+              <a:schemeClr val="tx1"/>
+            </a:solidFill>
+          </a:ln>
+        </p:spPr>
+        <p:style>
+          <a:lnRef idx="2">
+            <a:schemeClr val="accent1">
+              <a:shade val="50000"/>
+            </a:schemeClr>
+          </a:lnRef>
+          <a:fillRef idx="1">
+            <a:schemeClr val="accent1"/>
+          </a:fillRef>
+          <a:effectRef idx="0">
+            <a:schemeClr val="accent1"/>
+          </a:effectRef>
+          <a:fontRef idx="minor">
+            <a:schemeClr val="lt1"/>
+          </a:fontRef>
+        </p:style>
+        <p:txBody>
+          <a:bodyPr rtlCol="0" anchor="ctr"/>
+          <a:lstStyle/>
+          <a:p>
+            <a:r>
+              <a:rPr lang="en-US" sz="1200" dirty="0">
+                <a:solidFill>
+                  <a:schemeClr val="tx1"/>
+                </a:solidFill>
+              </a:rPr>
+              <a:t>This map shows funding flows (</a:t>
+            </a:r>
+            <a:r>
+              <a:rPr lang="en-US" sz="1200" dirty="0">
+                <a:solidFill>
+                  <a:schemeClr val="tx1"/>
+                </a:solidFill>
+                <a:hlinkClick r:id="rId4"/>
+              </a:rPr>
+              <a:t>commitments or disbursements</a:t>
+            </a:r>
+            <a:r>
+              <a:rPr lang="en-US" sz="1200" dirty="0">
+                <a:solidFill>
+                  <a:schemeClr val="tx1"/>
+                </a:solidFill>
+              </a:rPr>
+              <a:t>) to data &amp; statistics to recipients grouped by quantiles. Click on a recipient to see the total amount and its breakdown by providers. </a:t>
+            </a:r>
+          </a:p>
+        </p:txBody>
+      </p:sp>
+      <p:cxnSp>
+        <p:nvCxnSpPr>
+          <p:cNvPr id="15" name="Straight Connector 14"/>
+          <p:cNvCxnSpPr/>
+          <p:nvPr/>
+        </p:nvCxnSpPr>
+        <p:spPr>
+          <a:xfrm flipH="1">
+            <a:off x="9591439" y="5740282"/>
+            <a:ext cx="140677" cy="150568"/>
+          </a:xfrm>
+          <a:prstGeom prst="line">
+            <a:avLst/>
+          </a:prstGeom>
+          <a:ln>
+            <a:solidFill>
+              <a:schemeClr val="tx1"/>
+            </a:solidFill>
+          </a:ln>
+        </p:spPr>
+        <p:style>
+          <a:lnRef idx="1">
+            <a:schemeClr val="accent1"/>
+          </a:lnRef>
+          <a:fillRef idx="0">
+            <a:schemeClr val="accent1"/>
+          </a:fillRef>
+          <a:effectRef idx="0">
+            <a:schemeClr val="accent1"/>
+          </a:effectRef>
+          <a:fontRef idx="minor">
+            <a:schemeClr val="tx1"/>
+          </a:fontRef>
+        </p:style>
+      </p:cxnSp>
+      <p:cxnSp>
+        <p:nvCxnSpPr>
+          <p:cNvPr id="17" name="Straight Connector 16"/>
+          <p:cNvCxnSpPr/>
+          <p:nvPr/>
+        </p:nvCxnSpPr>
+        <p:spPr>
+          <a:xfrm>
+            <a:off x="9582646" y="5740282"/>
+            <a:ext cx="167054" cy="159360"/>
+          </a:xfrm>
+          <a:prstGeom prst="line">
+            <a:avLst/>
+          </a:prstGeom>
+          <a:ln>
+            <a:solidFill>
+              <a:schemeClr val="tx1"/>
+            </a:solidFill>
+          </a:ln>
+        </p:spPr>
+        <p:style>
+          <a:lnRef idx="1">
+            <a:schemeClr val="accent1"/>
+          </a:lnRef>
+          <a:fillRef idx="0">
+            <a:schemeClr val="accent1"/>
+          </a:fillRef>
+          <a:effectRef idx="0">
+            <a:schemeClr val="accent1"/>
+          </a:effectRef>
+          <a:fontRef idx="minor">
+            <a:schemeClr val="tx1"/>
+          </a:fontRef>
+        </p:style>
+      </p:cxnSp>
+      <p:grpSp>
+        <p:nvGrpSpPr>
+          <p:cNvPr id="18" name="Group 17"/>
+          <p:cNvGrpSpPr/>
+          <p:nvPr/>
+        </p:nvGrpSpPr>
+        <p:grpSpPr>
+          <a:xfrm>
+            <a:off x="2474301" y="5673044"/>
+            <a:ext cx="699722" cy="304435"/>
+            <a:chOff x="2474301" y="5673044"/>
+            <a:chExt cx="699722" cy="304435"/>
+          </a:xfrm>
+        </p:grpSpPr>
+        <p:pic>
+          <p:nvPicPr>
+            <p:cNvPr id="11" name="Picture 10"/>
+            <p:cNvPicPr>
+              <a:picLocks noChangeAspect="1"/>
+            </p:cNvPicPr>
+            <p:nvPr/>
+          </p:nvPicPr>
+          <p:blipFill rotWithShape="1">
+            <a:blip r:embed="rId5"/>
+            <a:srcRect r="37744" b="11026"/>
+            <a:stretch/>
+          </p:blipFill>
+          <p:spPr>
+            <a:xfrm>
+              <a:off x="2474301" y="5673044"/>
+              <a:ext cx="699722" cy="288142"/>
+            </a:xfrm>
+            <a:prstGeom prst="rect">
+              <a:avLst/>
+            </a:prstGeom>
+          </p:spPr>
+        </p:pic>
+        <p:pic>
+          <p:nvPicPr>
+            <p:cNvPr id="1026" name="Picture 2" descr="Explain Vector Icons free download in SVG, PNG Format"/>
+            <p:cNvPicPr>
+              <a:picLocks noChangeAspect="1" noChangeArrowheads="1"/>
+            </p:cNvPicPr>
+            <p:nvPr/>
+          </p:nvPicPr>
+          <p:blipFill>
+            <a:blip r:embed="rId6" cstate="print">
+              <a:extLst>
+                <a:ext uri="{28A0092B-C50C-407E-A947-70E740481C1C}">
+                  <a14:useLocalDpi xmlns:a14="http://schemas.microsoft.com/office/drawing/2010/main" val="0"/>
+                </a:ext>
+              </a:extLst>
+            </a:blip>
+            <a:srcRect/>
+            <a:stretch>
+              <a:fillRect/>
+            </a:stretch>
+          </p:blipFill>
+          <p:spPr bwMode="auto">
+            <a:xfrm>
+              <a:off x="2474301" y="5673044"/>
+              <a:ext cx="304435" cy="304435"/>
+            </a:xfrm>
+            <a:prstGeom prst="rect">
+              <a:avLst/>
+            </a:prstGeom>
+            <a:solidFill>
+              <a:schemeClr val="bg1"/>
+            </a:solidFill>
+          </p:spPr>
+        </p:pic>
+      </p:grpSp>
+      <p:sp>
+        <p:nvSpPr>
           <p:cNvPr id="3" name="TextBox 2">
             <a:extLst>
               <a:ext uri="{FF2B5EF4-FFF2-40B4-BE49-F238E27FC236}">
@@ -7753,8 +8339,8 @@
         </p:nvSpPr>
         <p:spPr>
           <a:xfrm>
-            <a:off x="9959788" y="4902857"/>
-            <a:ext cx="2232212" cy="938719"/>
+            <a:off x="4622513" y="6458434"/>
+            <a:ext cx="5376108" cy="430887"/>
           </a:xfrm>
           <a:prstGeom prst="rect">
             <a:avLst/>
@@ -7774,6 +8360,45 @@
                 </a:solidFill>
               </a:rPr>
               <a:t>https://paris21-data.github.io/CH_methodology_note/financing-dev-data.html#commitments-and-disbursements</a:t>
+            </a:r>
+          </a:p>
+        </p:txBody>
+      </p:sp>
+      <p:sp>
+        <p:nvSpPr>
+          <p:cNvPr id="2" name="TextBox 1">
+            <a:extLst>
+              <a:ext uri="{FF2B5EF4-FFF2-40B4-BE49-F238E27FC236}">
+                <a16:creationId xmlns:a16="http://schemas.microsoft.com/office/drawing/2014/main" id="{F93A39DB-98E0-0DFF-3E1B-EF5F2E1D2A10}"/>
+              </a:ext>
+            </a:extLst>
+          </p:cNvPr>
+          <p:cNvSpPr txBox="1"/>
+          <p:nvPr/>
+        </p:nvSpPr>
+        <p:spPr>
+          <a:xfrm>
+            <a:off x="7270075" y="5106498"/>
+            <a:ext cx="3734938" cy="400110"/>
+          </a:xfrm>
+          <a:prstGeom prst="rect">
+            <a:avLst/>
+          </a:prstGeom>
+          <a:noFill/>
+        </p:spPr>
+        <p:txBody>
+          <a:bodyPr wrap="square">
+            <a:spAutoFit/>
+          </a:bodyPr>
+          <a:lstStyle/>
+          <a:p>
+            <a:r>
+              <a:rPr lang="en-DE" sz="1000" dirty="0">
+                <a:solidFill>
+                  <a:srgbClr val="00B0F0"/>
+                </a:solidFill>
+              </a:rPr>
+              <a:t>https://paris21-data.github.io/CH_methodology_note/about-the-data.html#paris21-press-data</a:t>
             </a:r>
           </a:p>
         </p:txBody>
@@ -8132,22 +8757,24 @@
           <a:lstStyle/>
           <a:p>
             <a:r>
-              <a:rPr lang="en-GB"/>
+              <a:rPr lang="en-GB" dirty="0"/>
               <a:t>Source: PARIS21 (2020), Statistical Capacity Monitor. </a:t>
             </a:r>
             <a:r>
-              <a:rPr lang="en-US"/>
+              <a:rPr lang="en-US" dirty="0"/>
               <a:t>See the </a:t>
             </a:r>
             <a:r>
-              <a:rPr lang="en-US" u="sng"/>
+              <a:rPr lang="en-US" u="sng" dirty="0">
+                <a:hlinkClick r:id="rId5"/>
+              </a:rPr>
               <a:t>methodology note </a:t>
             </a:r>
             <a:r>
-              <a:rPr lang="en-US"/>
+              <a:rPr lang="en-US" dirty="0"/>
               <a:t>for details.</a:t>
             </a:r>
-            <a:endParaRPr lang="en-GB"/>
+            <a:endParaRPr lang="en-GB" dirty="0"/>
           </a:p>
         </p:txBody>
       </p:sp>
@@ -8186,7 +8813,9 @@
               <a:t>Open Data Watch (2020), Open Data Inventory. See the </a:t>
             </a:r>
             <a:r>
-              <a:rPr lang="en-US" u="sng" dirty="0"/>
+              <a:rPr lang="en-US" u="sng" dirty="0">
+                <a:hlinkClick r:id="rId6"/>
+              </a:rPr>
               <a:t>methodology note </a:t>
             </a:r>
             <a:r>
@@ -8232,7 +8861,9 @@
               <a:t>See the </a:t>
             </a:r>
             <a:r>
-              <a:rPr lang="en-US" u="sng" dirty="0"/>
+              <a:rPr lang="en-US" u="sng" dirty="0">
+                <a:hlinkClick r:id="rId7"/>
+              </a:rPr>
               <a:t>methodology note </a:t>
             </a:r>
             <a:r>
@@ -8240,6 +8871,128 @@
               <a:t>for details.</a:t>
             </a:r>
             <a:endParaRPr lang="en-GB" dirty="0"/>
+          </a:p>
+        </p:txBody>
+      </p:sp>
+      <p:sp>
+        <p:nvSpPr>
+          <p:cNvPr id="3" name="TextBox 2">
+            <a:extLst>
+              <a:ext uri="{FF2B5EF4-FFF2-40B4-BE49-F238E27FC236}">
+                <a16:creationId xmlns:a16="http://schemas.microsoft.com/office/drawing/2014/main" id="{F54252AB-6C1D-0E6C-4686-5F6F9D7D4E52}"/>
+              </a:ext>
+            </a:extLst>
+          </p:cNvPr>
+          <p:cNvSpPr txBox="1"/>
+          <p:nvPr/>
+        </p:nvSpPr>
+        <p:spPr>
+          <a:xfrm>
+            <a:off x="9715597" y="3514573"/>
+            <a:ext cx="1470212" cy="1061829"/>
+          </a:xfrm>
+          <a:prstGeom prst="rect">
+            <a:avLst/>
+          </a:prstGeom>
+          <a:noFill/>
+        </p:spPr>
+        <p:txBody>
+          <a:bodyPr wrap="square">
+            <a:spAutoFit/>
+          </a:bodyPr>
+          <a:lstStyle/>
+          <a:p>
+            <a:r>
+              <a:rPr lang="en-US" sz="1050" dirty="0">
+                <a:solidFill>
+                  <a:srgbClr val="00B0F0"/>
+                </a:solidFill>
+              </a:rPr>
+              <a:t>https://paris21-data.github.io/CH_methodology_note/about-the-data.html#open-data-watch---open-data-inventory</a:t>
+            </a:r>
+            <a:endParaRPr lang="en-DE" sz="1050" dirty="0">
+              <a:solidFill>
+                <a:srgbClr val="00B0F0"/>
+              </a:solidFill>
+            </a:endParaRPr>
+          </a:p>
+        </p:txBody>
+      </p:sp>
+      <p:sp>
+        <p:nvSpPr>
+          <p:cNvPr id="4" name="TextBox 3">
+            <a:extLst>
+              <a:ext uri="{FF2B5EF4-FFF2-40B4-BE49-F238E27FC236}">
+                <a16:creationId xmlns:a16="http://schemas.microsoft.com/office/drawing/2014/main" id="{AD5DD871-6C81-7249-2A49-902140609D74}"/>
+              </a:ext>
+            </a:extLst>
+          </p:cNvPr>
+          <p:cNvSpPr txBox="1"/>
+          <p:nvPr/>
+        </p:nvSpPr>
+        <p:spPr>
+          <a:xfrm>
+            <a:off x="9730062" y="5896865"/>
+            <a:ext cx="1532965" cy="1015663"/>
+          </a:xfrm>
+          <a:prstGeom prst="rect">
+            <a:avLst/>
+          </a:prstGeom>
+          <a:noFill/>
+        </p:spPr>
+        <p:txBody>
+          <a:bodyPr wrap="square">
+            <a:spAutoFit/>
+          </a:bodyPr>
+          <a:lstStyle/>
+          <a:p>
+            <a:r>
+              <a:rPr lang="en-DE" sz="1000" dirty="0">
+                <a:solidFill>
+                  <a:srgbClr val="00B0F0"/>
+                </a:solidFill>
+              </a:rPr>
+              <a:t>https://paris21-data.github.io/CH_methodology_note/about-the-data.html#world-bank-statistical-performance-indicators</a:t>
+            </a:r>
+          </a:p>
+        </p:txBody>
+      </p:sp>
+      <p:sp>
+        <p:nvSpPr>
+          <p:cNvPr id="13" name="TextBox 12">
+            <a:extLst>
+              <a:ext uri="{FF2B5EF4-FFF2-40B4-BE49-F238E27FC236}">
+                <a16:creationId xmlns:a16="http://schemas.microsoft.com/office/drawing/2014/main" id="{37DDFC60-48D6-9D25-EBBD-1D4919850BF3}"/>
+              </a:ext>
+            </a:extLst>
+          </p:cNvPr>
+          <p:cNvSpPr txBox="1"/>
+          <p:nvPr/>
+        </p:nvSpPr>
+        <p:spPr>
+          <a:xfrm>
+            <a:off x="9148483" y="1675624"/>
+            <a:ext cx="2882153" cy="553998"/>
+          </a:xfrm>
+          <a:prstGeom prst="rect">
+            <a:avLst/>
+          </a:prstGeom>
+          <a:noFill/>
+        </p:spPr>
+        <p:txBody>
+          <a:bodyPr wrap="square">
+            <a:spAutoFit/>
+          </a:bodyPr>
+          <a:lstStyle/>
+          <a:p>
+            <a:r>
+              <a:rPr lang="en-DE" sz="1000" dirty="0">
+                <a:solidFill>
+                  <a:srgbClr val="00B0F0"/>
+                </a:solidFill>
+              </a:rPr>
+              <a:t>https://paris21-data.github.io/CH_methodology_note/about-the-data.html#paris21-statistical-capacity-monitor</a:t>
+            </a:r>
           </a:p>
         </p:txBody>
       </p:sp>
@@ -8503,7 +9256,9 @@
               <a:t>Data below are sourced from the pilot assessments by PARIS21. Pilot assessments provided a precise picture of the diversity of financing to data and statistics on the ground. They were conducted in July – September 2021. See the </a:t>
             </a:r>
             <a:r>
-              <a:rPr lang="en-US" u="sng" dirty="0"/>
+              <a:rPr lang="en-US" u="sng" dirty="0">
+                <a:hlinkClick r:id="rId4"/>
+              </a:rPr>
               <a:t>methodology note </a:t>
             </a:r>
             <a:r>
@@ -8549,7 +9304,9 @@
               <a:t>See the </a:t>
             </a:r>
             <a:r>
-              <a:rPr lang="en-US" u="sng" dirty="0"/>
+              <a:rPr lang="en-US" u="sng" dirty="0">
+                <a:hlinkClick r:id="rId5"/>
+              </a:rPr>
               <a:t>methodology note </a:t>
             </a:r>
             <a:r>
@@ -8557,6 +9314,84 @@
               <a:t>for details.</a:t>
             </a:r>
             <a:endParaRPr lang="en-GB" dirty="0"/>
+          </a:p>
+        </p:txBody>
+      </p:sp>
+      <p:sp>
+        <p:nvSpPr>
+          <p:cNvPr id="2" name="TextBox 1">
+            <a:extLst>
+              <a:ext uri="{FF2B5EF4-FFF2-40B4-BE49-F238E27FC236}">
+                <a16:creationId xmlns:a16="http://schemas.microsoft.com/office/drawing/2014/main" id="{943C0AA7-B4F1-294D-F703-733B8D30A61A}"/>
+              </a:ext>
+            </a:extLst>
+          </p:cNvPr>
+          <p:cNvSpPr txBox="1"/>
+          <p:nvPr/>
+        </p:nvSpPr>
+        <p:spPr>
+          <a:xfrm>
+            <a:off x="4763887" y="2875002"/>
+            <a:ext cx="2882153" cy="553998"/>
+          </a:xfrm>
+          <a:prstGeom prst="rect">
+            <a:avLst/>
+          </a:prstGeom>
+          <a:noFill/>
+        </p:spPr>
+        <p:txBody>
+          <a:bodyPr wrap="square">
+            <a:spAutoFit/>
+          </a:bodyPr>
+          <a:lstStyle/>
+          <a:p>
+            <a:r>
+              <a:rPr lang="en-DE" sz="1000" dirty="0">
+                <a:solidFill>
+                  <a:srgbClr val="00B0F0"/>
+                </a:solidFill>
+              </a:rPr>
+              <a:t>https://paris21-data.github.io/CH_methodology_note/about-the-data.html#paris21-statistical-capacity-monitor</a:t>
+            </a:r>
+          </a:p>
+        </p:txBody>
+      </p:sp>
+      <p:sp>
+        <p:nvSpPr>
+          <p:cNvPr id="8" name="TextBox 7">
+            <a:extLst>
+              <a:ext uri="{FF2B5EF4-FFF2-40B4-BE49-F238E27FC236}">
+                <a16:creationId xmlns:a16="http://schemas.microsoft.com/office/drawing/2014/main" id="{E78EE041-27AA-A31C-119A-8061E3688626}"/>
+              </a:ext>
+            </a:extLst>
+          </p:cNvPr>
+          <p:cNvSpPr txBox="1"/>
+          <p:nvPr/>
+        </p:nvSpPr>
+        <p:spPr>
+          <a:xfrm>
+            <a:off x="9601200" y="5480223"/>
+            <a:ext cx="2026024" cy="707886"/>
+          </a:xfrm>
+          <a:prstGeom prst="rect">
+            <a:avLst/>
+          </a:prstGeom>
+          <a:noFill/>
+        </p:spPr>
+        <p:txBody>
+          <a:bodyPr wrap="square">
+            <a:spAutoFit/>
+          </a:bodyPr>
+          <a:lstStyle/>
+          <a:p>
+            <a:r>
+              <a:rPr lang="en-DE" sz="1000" dirty="0">
+                <a:solidFill>
+                  <a:srgbClr val="00B0F0"/>
+                </a:solidFill>
+              </a:rPr>
+              <a:t>https://paris21-data.github.io/CH_methodology_note/about-the-data.html#paris21---pilot-assessments</a:t>
+            </a:r>
           </a:p>
         </p:txBody>
       </p:sp>
@@ -8721,8 +9556,14 @@
               <a:t>Data below are sourced from the pilot assessments by PARIS21. Pilot assessments provided a precise picture of the diversity of financing to data and statistics on the ground. They were conducted in July – September 2021. See the </a:t>
             </a:r>
             <a:r>
+              <a:rPr lang="en-US" u="sng" dirty="0">
+                <a:hlinkClick r:id="rId3"/>
+              </a:rPr>
+              <a:t>methodology note</a:t>
+            </a:r>
+            <a:r>
               <a:rPr lang="en-US" u="sng" dirty="0"/>
-              <a:t>methodology note </a:t>
+              <a:t> </a:t>
             </a:r>
             <a:r>
               <a:rPr lang="en-US" dirty="0"/>
@@ -8776,6 +9617,45 @@
             <a:r>
               <a:rPr lang="en-GB"/>
               <a:t>C</a:t>
+            </a:r>
+          </a:p>
+        </p:txBody>
+      </p:sp>
+      <p:sp>
+        <p:nvSpPr>
+          <p:cNvPr id="2" name="TextBox 1">
+            <a:extLst>
+              <a:ext uri="{FF2B5EF4-FFF2-40B4-BE49-F238E27FC236}">
+                <a16:creationId xmlns:a16="http://schemas.microsoft.com/office/drawing/2014/main" id="{D8C96C91-687A-4C37-5035-96E835D9D955}"/>
+              </a:ext>
+            </a:extLst>
+          </p:cNvPr>
+          <p:cNvSpPr txBox="1"/>
+          <p:nvPr/>
+        </p:nvSpPr>
+        <p:spPr>
+          <a:xfrm>
+            <a:off x="8507506" y="2620482"/>
+            <a:ext cx="2026024" cy="707886"/>
+          </a:xfrm>
+          <a:prstGeom prst="rect">
+            <a:avLst/>
+          </a:prstGeom>
+          <a:noFill/>
+        </p:spPr>
+        <p:txBody>
+          <a:bodyPr wrap="square">
+            <a:spAutoFit/>
+          </a:bodyPr>
+          <a:lstStyle/>
+          <a:p>
+            <a:r>
+              <a:rPr lang="en-DE" sz="1000" dirty="0">
+                <a:solidFill>
+                  <a:srgbClr val="00B0F0"/>
+                </a:solidFill>
+              </a:rPr>
+              <a:t>https://paris21-data.github.io/CH_methodology_note/about-the-data.html#paris21---pilot-assessments</a:t>
             </a:r>
           </a:p>
         </p:txBody>
@@ -8990,30 +9870,32 @@
           <a:lstStyle/>
           <a:p>
             <a:r>
-              <a:rPr lang="en-GB"/>
+              <a:rPr lang="en-GB" dirty="0"/>
               <a:t>Source: </a:t>
             </a:r>
             <a:r>
-              <a:rPr lang="en-US"/>
+              <a:rPr lang="en-US" dirty="0"/>
               <a:t>OECD (2021), Data for Development Profiles</a:t>
             </a:r>
             <a:r>
-              <a:rPr lang="en-GB"/>
+              <a:rPr lang="en-GB" dirty="0"/>
               <a:t>. </a:t>
             </a:r>
             <a:r>
-              <a:rPr lang="en-US"/>
+              <a:rPr lang="en-US" dirty="0"/>
               <a:t>See the </a:t>
             </a:r>
             <a:r>
-              <a:rPr lang="en-US" u="sng"/>
+              <a:rPr lang="en-US" u="sng" dirty="0">
+                <a:hlinkClick r:id="rId3"/>
+              </a:rPr>
               <a:t>methodology note </a:t>
             </a:r>
             <a:r>
-              <a:rPr lang="en-US"/>
+              <a:rPr lang="en-US" dirty="0"/>
               <a:t>for details.</a:t>
             </a:r>
-            <a:endParaRPr lang="en-GB"/>
+            <a:endParaRPr lang="en-GB" dirty="0"/>
           </a:p>
         </p:txBody>
       </p:sp>
@@ -9092,11 +9974,11 @@
           <a:lstStyle/>
           <a:p>
             <a:r>
-              <a:rPr lang="en-GB"/>
+              <a:rPr lang="en-GB" dirty="0"/>
               <a:t>Source: </a:t>
             </a:r>
             <a:r>
-              <a:rPr lang="en-US">
+              <a:rPr lang="en-US" dirty="0">
                 <a:solidFill>
                   <a:schemeClr val="bg1">
                     <a:lumMod val="50000"/>
@@ -9106,18 +9988,20 @@
               <a:t>PARIS21 (2021), Partner Report on Support to Statistics. </a:t>
             </a:r>
             <a:r>
-              <a:rPr lang="en-US"/>
+              <a:rPr lang="en-US" dirty="0"/>
               <a:t>See the </a:t>
             </a:r>
             <a:r>
-              <a:rPr lang="en-US" u="sng"/>
+              <a:rPr lang="en-US" u="sng" dirty="0">
+                <a:hlinkClick r:id="rId4"/>
+              </a:rPr>
               <a:t>methodology note </a:t>
             </a:r>
             <a:r>
-              <a:rPr lang="en-US"/>
+              <a:rPr lang="en-US" dirty="0"/>
               <a:t>for details.</a:t>
             </a:r>
-            <a:endParaRPr lang="en-GB"/>
+            <a:endParaRPr lang="en-GB" dirty="0"/>
           </a:p>
         </p:txBody>
       </p:sp>
@@ -9130,7 +10014,7 @@
           <p:nvPr/>
         </p:nvPicPr>
         <p:blipFill>
-          <a:blip r:embed="rId3"/>
+          <a:blip r:embed="rId5"/>
           <a:stretch>
             <a:fillRect/>
           </a:stretch>
@@ -9145,6 +10029,89 @@
           </a:prstGeom>
         </p:spPr>
       </p:pic>
+      <p:sp>
+        <p:nvSpPr>
+          <p:cNvPr id="2" name="TextBox 1">
+            <a:extLst>
+              <a:ext uri="{FF2B5EF4-FFF2-40B4-BE49-F238E27FC236}">
+                <a16:creationId xmlns:a16="http://schemas.microsoft.com/office/drawing/2014/main" id="{4B203433-09DA-98E2-B2C3-417EA2BA4B1B}"/>
+              </a:ext>
+            </a:extLst>
+          </p:cNvPr>
+          <p:cNvSpPr txBox="1"/>
+          <p:nvPr/>
+        </p:nvSpPr>
+        <p:spPr>
+          <a:xfrm>
+            <a:off x="2321859" y="2697672"/>
+            <a:ext cx="3774141" cy="430887"/>
+          </a:xfrm>
+          <a:prstGeom prst="rect">
+            <a:avLst/>
+          </a:prstGeom>
+          <a:noFill/>
+        </p:spPr>
+        <p:txBody>
+          <a:bodyPr wrap="square">
+            <a:spAutoFit/>
+          </a:bodyPr>
+          <a:lstStyle/>
+          <a:p>
+            <a:r>
+              <a:rPr lang="en-US" sz="1100" dirty="0">
+                <a:solidFill>
+                  <a:srgbClr val="00B0F0"/>
+                </a:solidFill>
+              </a:rPr>
+              <a:t>https://paris21-data.github.io/CH_methodology_note/about-the-data.html#oecd-data-for-development-profiles</a:t>
+            </a:r>
+            <a:endParaRPr lang="en-DE" sz="1100" dirty="0">
+              <a:solidFill>
+                <a:srgbClr val="00B0F0"/>
+              </a:solidFill>
+            </a:endParaRPr>
+          </a:p>
+        </p:txBody>
+      </p:sp>
+      <p:sp>
+        <p:nvSpPr>
+          <p:cNvPr id="9" name="TextBox 8">
+            <a:extLst>
+              <a:ext uri="{FF2B5EF4-FFF2-40B4-BE49-F238E27FC236}">
+                <a16:creationId xmlns:a16="http://schemas.microsoft.com/office/drawing/2014/main" id="{49572D7D-2AEA-B483-8F7F-96F2FCA5D1E2}"/>
+              </a:ext>
+            </a:extLst>
+          </p:cNvPr>
+          <p:cNvSpPr txBox="1"/>
+          <p:nvPr/>
+        </p:nvSpPr>
+        <p:spPr>
+          <a:xfrm>
+            <a:off x="2321859" y="4794382"/>
+            <a:ext cx="2873059" cy="553998"/>
+          </a:xfrm>
+          <a:prstGeom prst="rect">
+            <a:avLst/>
+          </a:prstGeom>
+          <a:noFill/>
+        </p:spPr>
+        <p:txBody>
+          <a:bodyPr wrap="square">
+            <a:spAutoFit/>
+          </a:bodyPr>
+          <a:lstStyle/>
+          <a:p>
+            <a:r>
+              <a:rPr lang="en-DE" sz="1000" dirty="0">
+                <a:solidFill>
+                  <a:srgbClr val="00B0F0"/>
+                </a:solidFill>
+              </a:rPr>
+              <a:t>https://paris21-data.github.io/CH_methodology_note/about-the-data.html#paris21-press-data</a:t>
+            </a:r>
+          </a:p>
+        </p:txBody>
+      </p:sp>
     </p:spTree>
     <p:extLst>
       <p:ext uri="{BB962C8B-B14F-4D97-AF65-F5344CB8AC3E}">
@@ -10010,6 +10977,89 @@
           </p:style>
         </p:cxnSp>
       </p:grpSp>
+      <p:sp>
+        <p:nvSpPr>
+          <p:cNvPr id="2" name="TextBox 1">
+            <a:extLst>
+              <a:ext uri="{FF2B5EF4-FFF2-40B4-BE49-F238E27FC236}">
+                <a16:creationId xmlns:a16="http://schemas.microsoft.com/office/drawing/2014/main" id="{3C48A7FD-A260-AE5F-96F7-84F8ED3C8397}"/>
+              </a:ext>
+            </a:extLst>
+          </p:cNvPr>
+          <p:cNvSpPr txBox="1"/>
+          <p:nvPr/>
+        </p:nvSpPr>
+        <p:spPr>
+          <a:xfrm>
+            <a:off x="2061521" y="4604510"/>
+            <a:ext cx="3774141" cy="430887"/>
+          </a:xfrm>
+          <a:prstGeom prst="rect">
+            <a:avLst/>
+          </a:prstGeom>
+          <a:noFill/>
+        </p:spPr>
+        <p:txBody>
+          <a:bodyPr wrap="square">
+            <a:spAutoFit/>
+          </a:bodyPr>
+          <a:lstStyle/>
+          <a:p>
+            <a:r>
+              <a:rPr lang="en-US" sz="1100" dirty="0">
+                <a:solidFill>
+                  <a:srgbClr val="00B0F0"/>
+                </a:solidFill>
+              </a:rPr>
+              <a:t>https://paris21-data.github.io/CH_methodology_note/about-the-data.html#oecd-data-for-development-profiles</a:t>
+            </a:r>
+            <a:endParaRPr lang="en-DE" sz="1100" dirty="0">
+              <a:solidFill>
+                <a:srgbClr val="00B0F0"/>
+              </a:solidFill>
+            </a:endParaRPr>
+          </a:p>
+        </p:txBody>
+      </p:sp>
+      <p:sp>
+        <p:nvSpPr>
+          <p:cNvPr id="3" name="TextBox 2">
+            <a:extLst>
+              <a:ext uri="{FF2B5EF4-FFF2-40B4-BE49-F238E27FC236}">
+                <a16:creationId xmlns:a16="http://schemas.microsoft.com/office/drawing/2014/main" id="{DC0B52B0-165F-443A-45DE-C6567DBB75B4}"/>
+              </a:ext>
+            </a:extLst>
+          </p:cNvPr>
+          <p:cNvSpPr txBox="1"/>
+          <p:nvPr/>
+        </p:nvSpPr>
+        <p:spPr>
+          <a:xfrm>
+            <a:off x="8693949" y="4608780"/>
+            <a:ext cx="2873059" cy="553998"/>
+          </a:xfrm>
+          <a:prstGeom prst="rect">
+            <a:avLst/>
+          </a:prstGeom>
+          <a:noFill/>
+        </p:spPr>
+        <p:txBody>
+          <a:bodyPr wrap="square">
+            <a:spAutoFit/>
+          </a:bodyPr>
+          <a:lstStyle/>
+          <a:p>
+            <a:r>
+              <a:rPr lang="en-DE" sz="1000" dirty="0">
+                <a:solidFill>
+                  <a:srgbClr val="00B0F0"/>
+                </a:solidFill>
+              </a:rPr>
+              <a:t>https://paris21-data.github.io/CH_methodology_note/about-the-data.html#paris21-press-data</a:t>
+            </a:r>
+          </a:p>
+        </p:txBody>
+      </p:sp>
     </p:spTree>
     <p:extLst>
       <p:ext uri="{BB962C8B-B14F-4D97-AF65-F5344CB8AC3E}">
@@ -10849,6 +11899,89 @@
           </p:style>
         </p:cxnSp>
       </p:grpSp>
+      <p:sp>
+        <p:nvSpPr>
+          <p:cNvPr id="5" name="TextBox 4">
+            <a:extLst>
+              <a:ext uri="{FF2B5EF4-FFF2-40B4-BE49-F238E27FC236}">
+                <a16:creationId xmlns:a16="http://schemas.microsoft.com/office/drawing/2014/main" id="{1F7DAE7A-3DFC-AB78-1385-059F102CEC92}"/>
+              </a:ext>
+            </a:extLst>
+          </p:cNvPr>
+          <p:cNvSpPr txBox="1"/>
+          <p:nvPr/>
+        </p:nvSpPr>
+        <p:spPr>
+          <a:xfrm>
+            <a:off x="1980839" y="4103890"/>
+            <a:ext cx="3774141" cy="430887"/>
+          </a:xfrm>
+          <a:prstGeom prst="rect">
+            <a:avLst/>
+          </a:prstGeom>
+          <a:noFill/>
+        </p:spPr>
+        <p:txBody>
+          <a:bodyPr wrap="square">
+            <a:spAutoFit/>
+          </a:bodyPr>
+          <a:lstStyle/>
+          <a:p>
+            <a:r>
+              <a:rPr lang="en-US" sz="1100" dirty="0">
+                <a:solidFill>
+                  <a:srgbClr val="00B0F0"/>
+                </a:solidFill>
+              </a:rPr>
+              <a:t>https://paris21-data.github.io/CH_methodology_note/about-the-data.html#oecd-data-for-development-profiles</a:t>
+            </a:r>
+            <a:endParaRPr lang="en-DE" sz="1100" dirty="0">
+              <a:solidFill>
+                <a:srgbClr val="00B0F0"/>
+              </a:solidFill>
+            </a:endParaRPr>
+          </a:p>
+        </p:txBody>
+      </p:sp>
+      <p:sp>
+        <p:nvSpPr>
+          <p:cNvPr id="6" name="TextBox 5">
+            <a:extLst>
+              <a:ext uri="{FF2B5EF4-FFF2-40B4-BE49-F238E27FC236}">
+                <a16:creationId xmlns:a16="http://schemas.microsoft.com/office/drawing/2014/main" id="{7614F65F-E933-71AC-1C91-82BBDA658552}"/>
+              </a:ext>
+            </a:extLst>
+          </p:cNvPr>
+          <p:cNvSpPr txBox="1"/>
+          <p:nvPr/>
+        </p:nvSpPr>
+        <p:spPr>
+          <a:xfrm>
+            <a:off x="7976773" y="4083842"/>
+            <a:ext cx="2873059" cy="553998"/>
+          </a:xfrm>
+          <a:prstGeom prst="rect">
+            <a:avLst/>
+          </a:prstGeom>
+          <a:noFill/>
+        </p:spPr>
+        <p:txBody>
+          <a:bodyPr wrap="square">
+            <a:spAutoFit/>
+          </a:bodyPr>
+          <a:lstStyle/>
+          <a:p>
+            <a:r>
+              <a:rPr lang="en-DE" sz="1000" dirty="0">
+                <a:solidFill>
+                  <a:srgbClr val="00B0F0"/>
+                </a:solidFill>
+              </a:rPr>
+              <a:t>https://paris21-data.github.io/CH_methodology_note/about-the-data.html#paris21-press-data</a:t>
+            </a:r>
+          </a:p>
+        </p:txBody>
+      </p:sp>
     </p:spTree>
     <p:extLst>
       <p:ext uri="{BB962C8B-B14F-4D97-AF65-F5344CB8AC3E}">
@@ -11283,6 +12416,45 @@
           </p:spPr>
         </p:pic>
       </p:grpSp>
+      <p:sp>
+        <p:nvSpPr>
+          <p:cNvPr id="2" name="TextBox 1">
+            <a:extLst>
+              <a:ext uri="{FF2B5EF4-FFF2-40B4-BE49-F238E27FC236}">
+                <a16:creationId xmlns:a16="http://schemas.microsoft.com/office/drawing/2014/main" id="{E9D6D5F7-ABE5-8053-1E01-2A9504505F89}"/>
+              </a:ext>
+            </a:extLst>
+          </p:cNvPr>
+          <p:cNvSpPr txBox="1"/>
+          <p:nvPr/>
+        </p:nvSpPr>
+        <p:spPr>
+          <a:xfrm>
+            <a:off x="5323219" y="4583705"/>
+            <a:ext cx="3734938" cy="400110"/>
+          </a:xfrm>
+          <a:prstGeom prst="rect">
+            <a:avLst/>
+          </a:prstGeom>
+          <a:noFill/>
+        </p:spPr>
+        <p:txBody>
+          <a:bodyPr wrap="square">
+            <a:spAutoFit/>
+          </a:bodyPr>
+          <a:lstStyle/>
+          <a:p>
+            <a:r>
+              <a:rPr lang="en-DE" sz="1000" dirty="0">
+                <a:solidFill>
+                  <a:srgbClr val="00B0F0"/>
+                </a:solidFill>
+              </a:rPr>
+              <a:t>https://paris21-data.github.io/CH_methodology_note/about-the-data.html#paris21-press-data</a:t>
+            </a:r>
+          </a:p>
+        </p:txBody>
+      </p:sp>
     </p:spTree>
     <p:extLst>
       <p:ext uri="{BB962C8B-B14F-4D97-AF65-F5344CB8AC3E}">
@@ -11723,6 +12895,50 @@
           </p:style>
         </p:cxnSp>
       </p:grpSp>
+      <p:sp>
+        <p:nvSpPr>
+          <p:cNvPr id="3" name="TextBox 2">
+            <a:extLst>
+              <a:ext uri="{FF2B5EF4-FFF2-40B4-BE49-F238E27FC236}">
+                <a16:creationId xmlns:a16="http://schemas.microsoft.com/office/drawing/2014/main" id="{34F12509-14E3-4A98-6D14-5C67AFB1610A}"/>
+              </a:ext>
+            </a:extLst>
+          </p:cNvPr>
+          <p:cNvSpPr txBox="1"/>
+          <p:nvPr/>
+        </p:nvSpPr>
+        <p:spPr>
+          <a:xfrm>
+            <a:off x="8347905" y="4781795"/>
+            <a:ext cx="3774141" cy="430887"/>
+          </a:xfrm>
+          <a:prstGeom prst="rect">
+            <a:avLst/>
+          </a:prstGeom>
+          <a:noFill/>
+        </p:spPr>
+        <p:txBody>
+          <a:bodyPr wrap="square">
+            <a:spAutoFit/>
+          </a:bodyPr>
+          <a:lstStyle/>
+          <a:p>
+            <a:r>
+              <a:rPr lang="en-US" sz="1100" dirty="0">
+                <a:solidFill>
+                  <a:srgbClr val="00B0F0"/>
+                </a:solidFill>
+              </a:rPr>
+              <a:t>https://paris21-data.github.io/CH_methodology_note/about-the-data.html#oecd-data-for-development-profiles</a:t>
+            </a:r>
+            <a:endParaRPr lang="en-DE" sz="1100" dirty="0">
+              <a:solidFill>
+                <a:srgbClr val="00B0F0"/>
+              </a:solidFill>
+            </a:endParaRPr>
+          </a:p>
+        </p:txBody>
+      </p:sp>
     </p:spTree>
     <p:extLst>
       <p:ext uri="{BB962C8B-B14F-4D97-AF65-F5344CB8AC3E}">
@@ -12155,6 +13371,45 @@
           </p:spPr>
         </p:pic>
       </p:grpSp>
+      <p:sp>
+        <p:nvSpPr>
+          <p:cNvPr id="2" name="TextBox 1">
+            <a:extLst>
+              <a:ext uri="{FF2B5EF4-FFF2-40B4-BE49-F238E27FC236}">
+                <a16:creationId xmlns:a16="http://schemas.microsoft.com/office/drawing/2014/main" id="{D842358B-1ACE-8D9B-E7B9-42F048B76547}"/>
+              </a:ext>
+            </a:extLst>
+          </p:cNvPr>
+          <p:cNvSpPr txBox="1"/>
+          <p:nvPr/>
+        </p:nvSpPr>
+        <p:spPr>
+          <a:xfrm>
+            <a:off x="4319172" y="4039345"/>
+            <a:ext cx="3734938" cy="400110"/>
+          </a:xfrm>
+          <a:prstGeom prst="rect">
+            <a:avLst/>
+          </a:prstGeom>
+          <a:noFill/>
+        </p:spPr>
+        <p:txBody>
+          <a:bodyPr wrap="square">
+            <a:spAutoFit/>
+          </a:bodyPr>
+          <a:lstStyle/>
+          <a:p>
+            <a:r>
+              <a:rPr lang="en-DE" sz="1000" dirty="0">
+                <a:solidFill>
+                  <a:srgbClr val="00B0F0"/>
+                </a:solidFill>
+              </a:rPr>
+              <a:t>https://paris21-data.github.io/CH_methodology_note/about-the-data.html#paris21-press-data</a:t>
+            </a:r>
+          </a:p>
+        </p:txBody>
+      </p:sp>
     </p:spTree>
     <p:extLst>
       <p:ext uri="{BB962C8B-B14F-4D97-AF65-F5344CB8AC3E}">
@@ -12522,8 +13777,8 @@
         </p:nvSpPr>
         <p:spPr>
           <a:xfrm>
-            <a:off x="9863763" y="4891497"/>
-            <a:ext cx="2232212" cy="938719"/>
+            <a:off x="4533414" y="6318806"/>
+            <a:ext cx="4727879" cy="430887"/>
           </a:xfrm>
           <a:prstGeom prst="rect">
             <a:avLst/>
@@ -12543,6 +13798,45 @@
                 </a:solidFill>
               </a:rPr>
               <a:t>https://paris21-data.github.io/CH_methodology_note/financing-dev-data.html#commitments-and-disbursements</a:t>
+            </a:r>
+          </a:p>
+        </p:txBody>
+      </p:sp>
+      <p:sp>
+        <p:nvSpPr>
+          <p:cNvPr id="6" name="TextBox 5">
+            <a:extLst>
+              <a:ext uri="{FF2B5EF4-FFF2-40B4-BE49-F238E27FC236}">
+                <a16:creationId xmlns:a16="http://schemas.microsoft.com/office/drawing/2014/main" id="{E1240161-9A3C-14FD-1A99-E93ABC241888}"/>
+              </a:ext>
+            </a:extLst>
+          </p:cNvPr>
+          <p:cNvSpPr txBox="1"/>
+          <p:nvPr/>
+        </p:nvSpPr>
+        <p:spPr>
+          <a:xfrm>
+            <a:off x="6116901" y="5170142"/>
+            <a:ext cx="6096000" cy="246221"/>
+          </a:xfrm>
+          <a:prstGeom prst="rect">
+            <a:avLst/>
+          </a:prstGeom>
+          <a:noFill/>
+        </p:spPr>
+        <p:txBody>
+          <a:bodyPr wrap="square">
+            <a:spAutoFit/>
+          </a:bodyPr>
+          <a:lstStyle/>
+          <a:p>
+            <a:r>
+              <a:rPr lang="en-DE" sz="1000" dirty="0">
+                <a:solidFill>
+                  <a:srgbClr val="00B0F0"/>
+                </a:solidFill>
+              </a:rPr>
+              <a:t>https://paris21-data.github.io/CH_methodology_note/about-the-data.html#paris21-press-data</a:t>
             </a:r>
           </a:p>
         </p:txBody>
@@ -12996,6 +14290,50 @@
           </p:spPr>
         </p:pic>
       </p:grpSp>
+      <p:sp>
+        <p:nvSpPr>
+          <p:cNvPr id="3" name="TextBox 2">
+            <a:extLst>
+              <a:ext uri="{FF2B5EF4-FFF2-40B4-BE49-F238E27FC236}">
+                <a16:creationId xmlns:a16="http://schemas.microsoft.com/office/drawing/2014/main" id="{ED8EAB98-CE92-152A-AA30-BD1FEC0962B7}"/>
+              </a:ext>
+            </a:extLst>
+          </p:cNvPr>
+          <p:cNvSpPr txBox="1"/>
+          <p:nvPr/>
+        </p:nvSpPr>
+        <p:spPr>
+          <a:xfrm>
+            <a:off x="6483247" y="5002641"/>
+            <a:ext cx="3774141" cy="430887"/>
+          </a:xfrm>
+          <a:prstGeom prst="rect">
+            <a:avLst/>
+          </a:prstGeom>
+          <a:noFill/>
+        </p:spPr>
+        <p:txBody>
+          <a:bodyPr wrap="square">
+            <a:spAutoFit/>
+          </a:bodyPr>
+          <a:lstStyle/>
+          <a:p>
+            <a:r>
+              <a:rPr lang="en-US" sz="1100" dirty="0">
+                <a:solidFill>
+                  <a:srgbClr val="00B0F0"/>
+                </a:solidFill>
+              </a:rPr>
+              <a:t>https://paris21-data.github.io/CH_methodology_note/about-the-data.html#oecd-data-for-development-profiles</a:t>
+            </a:r>
+            <a:endParaRPr lang="en-DE" sz="1100" dirty="0">
+              <a:solidFill>
+                <a:srgbClr val="00B0F0"/>
+              </a:solidFill>
+            </a:endParaRPr>
+          </a:p>
+        </p:txBody>
+      </p:sp>
     </p:spTree>
     <p:extLst>
       <p:ext uri="{BB962C8B-B14F-4D97-AF65-F5344CB8AC3E}">
@@ -13416,6 +14754,45 @@
           </p:spPr>
         </p:pic>
       </p:grpSp>
+      <p:sp>
+        <p:nvSpPr>
+          <p:cNvPr id="4" name="TextBox 3">
+            <a:extLst>
+              <a:ext uri="{FF2B5EF4-FFF2-40B4-BE49-F238E27FC236}">
+                <a16:creationId xmlns:a16="http://schemas.microsoft.com/office/drawing/2014/main" id="{1BB1E23E-52D8-1FD3-D9D2-0D5A30B4BB8E}"/>
+              </a:ext>
+            </a:extLst>
+          </p:cNvPr>
+          <p:cNvSpPr txBox="1"/>
+          <p:nvPr/>
+        </p:nvSpPr>
+        <p:spPr>
+          <a:xfrm>
+            <a:off x="6451413" y="3335906"/>
+            <a:ext cx="3734938" cy="400110"/>
+          </a:xfrm>
+          <a:prstGeom prst="rect">
+            <a:avLst/>
+          </a:prstGeom>
+          <a:noFill/>
+        </p:spPr>
+        <p:txBody>
+          <a:bodyPr wrap="square">
+            <a:spAutoFit/>
+          </a:bodyPr>
+          <a:lstStyle/>
+          <a:p>
+            <a:r>
+              <a:rPr lang="en-DE" sz="1000" dirty="0">
+                <a:solidFill>
+                  <a:srgbClr val="00B0F0"/>
+                </a:solidFill>
+              </a:rPr>
+              <a:t>https://paris21-data.github.io/CH_methodology_note/about-the-data.html#paris21-press-data</a:t>
+            </a:r>
+          </a:p>
+        </p:txBody>
+      </p:sp>
     </p:spTree>
     <p:extLst>
       <p:ext uri="{BB962C8B-B14F-4D97-AF65-F5344CB8AC3E}">
@@ -13825,6 +15202,89 @@
           </a:p>
         </p:txBody>
       </p:sp>
+      <p:sp>
+        <p:nvSpPr>
+          <p:cNvPr id="2" name="TextBox 1">
+            <a:extLst>
+              <a:ext uri="{FF2B5EF4-FFF2-40B4-BE49-F238E27FC236}">
+                <a16:creationId xmlns:a16="http://schemas.microsoft.com/office/drawing/2014/main" id="{D041FF99-2711-155E-FD42-985D7CAEA57B}"/>
+              </a:ext>
+            </a:extLst>
+          </p:cNvPr>
+          <p:cNvSpPr txBox="1"/>
+          <p:nvPr/>
+        </p:nvSpPr>
+        <p:spPr>
+          <a:xfrm>
+            <a:off x="8187901" y="4322885"/>
+            <a:ext cx="3734938" cy="400110"/>
+          </a:xfrm>
+          <a:prstGeom prst="rect">
+            <a:avLst/>
+          </a:prstGeom>
+          <a:noFill/>
+        </p:spPr>
+        <p:txBody>
+          <a:bodyPr wrap="square">
+            <a:spAutoFit/>
+          </a:bodyPr>
+          <a:lstStyle/>
+          <a:p>
+            <a:r>
+              <a:rPr lang="en-DE" sz="1000" dirty="0">
+                <a:solidFill>
+                  <a:srgbClr val="00B0F0"/>
+                </a:solidFill>
+              </a:rPr>
+              <a:t>https://paris21-data.github.io/CH_methodology_note/about-the-data.html#paris21-press-data</a:t>
+            </a:r>
+          </a:p>
+        </p:txBody>
+      </p:sp>
+      <p:sp>
+        <p:nvSpPr>
+          <p:cNvPr id="6" name="TextBox 5">
+            <a:extLst>
+              <a:ext uri="{FF2B5EF4-FFF2-40B4-BE49-F238E27FC236}">
+                <a16:creationId xmlns:a16="http://schemas.microsoft.com/office/drawing/2014/main" id="{F7367576-6A53-C43B-33DA-C20A8A7C5952}"/>
+              </a:ext>
+            </a:extLst>
+          </p:cNvPr>
+          <p:cNvSpPr txBox="1"/>
+          <p:nvPr/>
+        </p:nvSpPr>
+        <p:spPr>
+          <a:xfrm>
+            <a:off x="2753929" y="4422760"/>
+            <a:ext cx="3774141" cy="430887"/>
+          </a:xfrm>
+          <a:prstGeom prst="rect">
+            <a:avLst/>
+          </a:prstGeom>
+          <a:noFill/>
+        </p:spPr>
+        <p:txBody>
+          <a:bodyPr wrap="square">
+            <a:spAutoFit/>
+          </a:bodyPr>
+          <a:lstStyle/>
+          <a:p>
+            <a:r>
+              <a:rPr lang="en-US" sz="1100" dirty="0">
+                <a:solidFill>
+                  <a:srgbClr val="00B0F0"/>
+                </a:solidFill>
+              </a:rPr>
+              <a:t>https://paris21-data.github.io/CH_methodology_note/about-the-data.html#oecd-data-for-development-profiles</a:t>
+            </a:r>
+            <a:endParaRPr lang="en-DE" sz="1100" dirty="0">
+              <a:solidFill>
+                <a:srgbClr val="00B0F0"/>
+              </a:solidFill>
+            </a:endParaRPr>
+          </a:p>
+        </p:txBody>
+      </p:sp>
     </p:spTree>
     <p:extLst>
       <p:ext uri="{BB962C8B-B14F-4D97-AF65-F5344CB8AC3E}">
@@ -14054,6 +15514,45 @@
           </a:ln>
         </p:spPr>
       </p:pic>
+      <p:sp>
+        <p:nvSpPr>
+          <p:cNvPr id="3" name="TextBox 2">
+            <a:extLst>
+              <a:ext uri="{FF2B5EF4-FFF2-40B4-BE49-F238E27FC236}">
+                <a16:creationId xmlns:a16="http://schemas.microsoft.com/office/drawing/2014/main" id="{D754A816-D743-EAC8-D8D8-FCA408EC392B}"/>
+              </a:ext>
+            </a:extLst>
+          </p:cNvPr>
+          <p:cNvSpPr txBox="1"/>
+          <p:nvPr/>
+        </p:nvSpPr>
+        <p:spPr>
+          <a:xfrm>
+            <a:off x="2280159" y="4881771"/>
+            <a:ext cx="3734938" cy="400110"/>
+          </a:xfrm>
+          <a:prstGeom prst="rect">
+            <a:avLst/>
+          </a:prstGeom>
+          <a:noFill/>
+        </p:spPr>
+        <p:txBody>
+          <a:bodyPr wrap="square">
+            <a:spAutoFit/>
+          </a:bodyPr>
+          <a:lstStyle/>
+          <a:p>
+            <a:r>
+              <a:rPr lang="en-DE" sz="1000" dirty="0">
+                <a:solidFill>
+                  <a:srgbClr val="00B0F0"/>
+                </a:solidFill>
+              </a:rPr>
+              <a:t>https://paris21-data.github.io/CH_methodology_note/about-the-data.html#paris21-press-data</a:t>
+            </a:r>
+          </a:p>
+        </p:txBody>
+      </p:sp>
     </p:spTree>
     <p:extLst>
       <p:ext uri="{BB962C8B-B14F-4D97-AF65-F5344CB8AC3E}">
@@ -14188,16 +15687,37 @@
           <a:lstStyle/>
           <a:p>
             <a:r>
-              <a:rPr lang="en-US" sz="1200">
+              <a:rPr lang="en-US" sz="1200" dirty="0">
                 <a:solidFill>
                   <a:schemeClr val="bg1">
                     <a:lumMod val="50000"/>
                   </a:schemeClr>
                 </a:solidFill>
               </a:rPr>
-              <a:t>This information is sourced by PARIS21 (2021). See the methodology note for details.</a:t>
-            </a:r>
-            <a:endParaRPr lang="en-GB" sz="1200">
+              <a:t>This information is sourced by PARIS21 (2021). See the </a:t>
+            </a:r>
+            <a:r>
+              <a:rPr lang="en-US" sz="1200" dirty="0">
+                <a:solidFill>
+                  <a:schemeClr val="bg1">
+                    <a:lumMod val="50000"/>
+                  </a:schemeClr>
+                </a:solidFill>
+                <a:hlinkClick r:id="rId2"/>
+              </a:rPr>
+              <a:t>methodology note </a:t>
+            </a:r>
+            <a:r>
+              <a:rPr lang="en-US" sz="1200" dirty="0">
+                <a:solidFill>
+                  <a:schemeClr val="bg1">
+                    <a:lumMod val="50000"/>
+                  </a:schemeClr>
+                </a:solidFill>
+              </a:rPr>
+              <a:t>for details.</a:t>
+            </a:r>
+            <a:endParaRPr lang="en-GB" sz="1200" dirty="0">
               <a:solidFill>
                 <a:schemeClr val="bg1">
                   <a:lumMod val="50000"/>
@@ -14216,7 +15736,7 @@
           <p:nvPr/>
         </p:nvPicPr>
         <p:blipFill>
-          <a:blip r:embed="rId2"/>
+          <a:blip r:embed="rId3"/>
           <a:stretch>
             <a:fillRect/>
           </a:stretch>
@@ -14276,6 +15796,50 @@
               </a:rPr>
               <a:t>DCD</a:t>
             </a:r>
+          </a:p>
+        </p:txBody>
+      </p:sp>
+      <p:sp>
+        <p:nvSpPr>
+          <p:cNvPr id="2" name="TextBox 1">
+            <a:extLst>
+              <a:ext uri="{FF2B5EF4-FFF2-40B4-BE49-F238E27FC236}">
+                <a16:creationId xmlns:a16="http://schemas.microsoft.com/office/drawing/2014/main" id="{D7B21624-1F52-ED09-1498-9375AAB30E4D}"/>
+              </a:ext>
+            </a:extLst>
+          </p:cNvPr>
+          <p:cNvSpPr txBox="1"/>
+          <p:nvPr/>
+        </p:nvSpPr>
+        <p:spPr>
+          <a:xfrm>
+            <a:off x="4228531" y="5936526"/>
+            <a:ext cx="3734938" cy="400110"/>
+          </a:xfrm>
+          <a:prstGeom prst="rect">
+            <a:avLst/>
+          </a:prstGeom>
+          <a:noFill/>
+        </p:spPr>
+        <p:txBody>
+          <a:bodyPr wrap="square">
+            <a:spAutoFit/>
+          </a:bodyPr>
+          <a:lstStyle/>
+          <a:p>
+            <a:r>
+              <a:rPr lang="en-US" sz="1000" dirty="0">
+                <a:solidFill>
+                  <a:srgbClr val="00B0F0"/>
+                </a:solidFill>
+              </a:rPr>
+              <a:t>https://paris21-data.github.io/CH_methodology_note/about-the-data.html#funding-opportunities-in-statistical-systems</a:t>
+            </a:r>
+            <a:endParaRPr lang="en-DE" sz="1000" dirty="0">
+              <a:solidFill>
+                <a:srgbClr val="00B0F0"/>
+              </a:solidFill>
+            </a:endParaRPr>
           </a:p>
         </p:txBody>
       </p:sp>
@@ -14480,6 +16044,45 @@
                 </a:schemeClr>
               </a:solidFill>
             </a:endParaRPr>
+          </a:p>
+        </p:txBody>
+      </p:sp>
+      <p:sp>
+        <p:nvSpPr>
+          <p:cNvPr id="2" name="TextBox 1">
+            <a:extLst>
+              <a:ext uri="{FF2B5EF4-FFF2-40B4-BE49-F238E27FC236}">
+                <a16:creationId xmlns:a16="http://schemas.microsoft.com/office/drawing/2014/main" id="{53962E69-4D90-DFBD-4F5F-AD056967B41D}"/>
+              </a:ext>
+            </a:extLst>
+          </p:cNvPr>
+          <p:cNvSpPr txBox="1"/>
+          <p:nvPr/>
+        </p:nvSpPr>
+        <p:spPr>
+          <a:xfrm>
+            <a:off x="4941237" y="4848839"/>
+            <a:ext cx="3734938" cy="400110"/>
+          </a:xfrm>
+          <a:prstGeom prst="rect">
+            <a:avLst/>
+          </a:prstGeom>
+          <a:noFill/>
+        </p:spPr>
+        <p:txBody>
+          <a:bodyPr wrap="square">
+            <a:spAutoFit/>
+          </a:bodyPr>
+          <a:lstStyle/>
+          <a:p>
+            <a:r>
+              <a:rPr lang="en-DE" sz="1000" dirty="0">
+                <a:solidFill>
+                  <a:srgbClr val="00B0F0"/>
+                </a:solidFill>
+              </a:rPr>
+              <a:t>https://paris21-data.github.io/CH_methodology_note/about-the-data.html#paris21-press-data</a:t>
+            </a:r>
           </a:p>
         </p:txBody>
       </p:sp>
@@ -15782,7 +17385,7 @@
         <p:spPr>
           <a:xfrm>
             <a:off x="7060791" y="2416635"/>
-            <a:ext cx="1779627" cy="461665"/>
+            <a:ext cx="1779627" cy="707886"/>
           </a:xfrm>
           <a:prstGeom prst="rect">
             <a:avLst/>
@@ -15796,7 +17399,7 @@
           <a:lstStyle/>
           <a:p>
             <a:r>
-              <a:rPr lang="en-DE" sz="800" dirty="0">
+              <a:rPr lang="en-DE" sz="1000" dirty="0">
                 <a:solidFill>
                   <a:srgbClr val="00B0F0"/>
                 </a:solidFill>
@@ -16084,7 +17687,28 @@
                   </a:schemeClr>
                 </a:solidFill>
               </a:rPr>
-              <a:t>PARIS21 (2021), Partner Report on Support to Statistics. See the methodology note for details.</a:t>
+              <a:t>PARIS21 (2021), Partner Report on Support to Statistics. See the </a:t>
+            </a:r>
+            <a:r>
+              <a:rPr lang="en-US" sz="1000" dirty="0">
+                <a:solidFill>
+                  <a:schemeClr val="bg1">
+                    <a:lumMod val="50000"/>
+                  </a:schemeClr>
+                </a:solidFill>
+                <a:hlinkClick r:id="rId5"/>
+              </a:rPr>
+              <a:t>methodology note </a:t>
+            </a:r>
+            <a:r>
+              <a:rPr lang="en-US" sz="1000" dirty="0">
+                <a:solidFill>
+                  <a:schemeClr val="bg1">
+                    <a:lumMod val="50000"/>
+                  </a:schemeClr>
+                </a:solidFill>
+              </a:rPr>
+              <a:t>for details.</a:t>
             </a:r>
             <a:endParaRPr lang="en-GB" sz="1000" dirty="0">
               <a:solidFill>
@@ -16172,7 +17796,7 @@
                 <a:solidFill>
                   <a:schemeClr val="tx1"/>
                 </a:solidFill>
-                <a:hlinkClick r:id="rId5"/>
+                <a:hlinkClick r:id="rId6"/>
               </a:rPr>
               <a:t>in-depth recipient profile </a:t>
             </a:r>
@@ -16189,7 +17813,7 @@
                 <a:solidFill>
                   <a:schemeClr val="tx1"/>
                 </a:solidFill>
-                <a:hlinkClick r:id="rId6"/>
+                <a:hlinkClick r:id="rId7"/>
               </a:rPr>
               <a:t>commitments</a:t>
             </a:r>
@@ -16312,7 +17936,7 @@
             <p:nvPr/>
           </p:nvPicPr>
           <p:blipFill rotWithShape="1">
-            <a:blip r:embed="rId7"/>
+            <a:blip r:embed="rId8"/>
             <a:srcRect r="37744" b="11026"/>
             <a:stretch/>
           </p:blipFill>
@@ -16335,7 +17959,7 @@
             <p:nvPr/>
           </p:nvPicPr>
           <p:blipFill>
-            <a:blip r:embed="rId8" cstate="print">
+            <a:blip r:embed="rId9" cstate="print">
               <a:extLst>
                 <a:ext uri="{28A0092B-C50C-407E-A947-70E740481C1C}">
                   <a14:useLocalDpi xmlns:a14="http://schemas.microsoft.com/office/drawing/2010/main" val="0"/>
@@ -16432,7 +18056,28 @@
                   </a:schemeClr>
                 </a:solidFill>
               </a:rPr>
-              <a:t>PARIS21 (2021), Partner Report on Support to Statistics. See the methodology note for details.</a:t>
+              <a:t>PARIS21 (2021), Partner Report on Support to Statistics. See the </a:t>
+            </a:r>
+            <a:r>
+              <a:rPr lang="en-US" sz="1000" dirty="0">
+                <a:solidFill>
+                  <a:schemeClr val="bg1">
+                    <a:lumMod val="50000"/>
+                  </a:schemeClr>
+                </a:solidFill>
+                <a:hlinkClick r:id="rId5"/>
+              </a:rPr>
+              <a:t>methodology note</a:t>
+            </a:r>
+            <a:r>
+              <a:rPr lang="en-US" sz="1000" dirty="0">
+                <a:solidFill>
+                  <a:schemeClr val="bg1">
+                    <a:lumMod val="50000"/>
+                  </a:schemeClr>
+                </a:solidFill>
+              </a:rPr>
+              <a:t> for details.</a:t>
             </a:r>
             <a:endParaRPr lang="en-GB" sz="1000" dirty="0">
               <a:solidFill>
@@ -16531,7 +18176,28 @@
                   </a:schemeClr>
                 </a:solidFill>
               </a:rPr>
-              <a:t>PARIS21 (2021), Partner Report on Support to Statistics. See the methodology note for details.</a:t>
+              <a:t>PARIS21 (2021), Partner Report on Support to Statistics. See the </a:t>
+            </a:r>
+            <a:r>
+              <a:rPr lang="en-US" sz="1000" dirty="0">
+                <a:solidFill>
+                  <a:schemeClr val="bg1">
+                    <a:lumMod val="50000"/>
+                  </a:schemeClr>
+                </a:solidFill>
+                <a:hlinkClick r:id="rId5"/>
+              </a:rPr>
+              <a:t>methodology note </a:t>
+            </a:r>
+            <a:r>
+              <a:rPr lang="en-US" sz="1000" dirty="0">
+                <a:solidFill>
+                  <a:schemeClr val="bg1">
+                    <a:lumMod val="50000"/>
+                  </a:schemeClr>
+                </a:solidFill>
+              </a:rPr>
+              <a:t>for details.</a:t>
             </a:r>
             <a:endParaRPr lang="en-GB" sz="1000" dirty="0">
               <a:solidFill>
@@ -16618,7 +18284,7 @@
                 <a:solidFill>
                   <a:schemeClr val="tx1"/>
                 </a:solidFill>
-                <a:hlinkClick r:id="rId9"/>
+                <a:hlinkClick r:id="rId5"/>
               </a:rPr>
               <a:t>providers for data and statistics</a:t>
             </a:r>
@@ -16741,7 +18407,7 @@
             <p:nvPr/>
           </p:nvPicPr>
           <p:blipFill rotWithShape="1">
-            <a:blip r:embed="rId7"/>
+            <a:blip r:embed="rId8"/>
             <a:srcRect r="37744" b="11026"/>
             <a:stretch/>
           </p:blipFill>
@@ -16764,7 +18430,7 @@
             <p:nvPr/>
           </p:nvPicPr>
           <p:blipFill>
-            <a:blip r:embed="rId8" cstate="print">
+            <a:blip r:embed="rId9" cstate="print">
               <a:extLst>
                 <a:ext uri="{28A0092B-C50C-407E-A947-70E740481C1C}">
                   <a14:useLocalDpi xmlns:a14="http://schemas.microsoft.com/office/drawing/2010/main" val="0"/>
@@ -16967,7 +18633,7 @@
             <p:nvPr/>
           </p:nvPicPr>
           <p:blipFill rotWithShape="1">
-            <a:blip r:embed="rId7"/>
+            <a:blip r:embed="rId8"/>
             <a:srcRect r="37744" b="11026"/>
             <a:stretch/>
           </p:blipFill>
@@ -16990,7 +18656,7 @@
             <p:nvPr/>
           </p:nvPicPr>
           <p:blipFill>
-            <a:blip r:embed="rId8" cstate="print">
+            <a:blip r:embed="rId9" cstate="print">
               <a:extLst>
                 <a:ext uri="{28A0092B-C50C-407E-A947-70E740481C1C}">
                   <a14:useLocalDpi xmlns:a14="http://schemas.microsoft.com/office/drawing/2010/main" val="0"/>
@@ -17113,7 +18779,7 @@
         </p:nvSpPr>
         <p:spPr>
           <a:xfrm>
-            <a:off x="8141702" y="6417747"/>
+            <a:off x="8258025" y="6375560"/>
             <a:ext cx="3774141" cy="430887"/>
           </a:xfrm>
           <a:prstGeom prst="rect">
@@ -17266,6 +18932,123 @@
           </a:fontRef>
         </p:style>
       </p:cxnSp>
+      <p:sp>
+        <p:nvSpPr>
+          <p:cNvPr id="2" name="TextBox 1">
+            <a:extLst>
+              <a:ext uri="{FF2B5EF4-FFF2-40B4-BE49-F238E27FC236}">
+                <a16:creationId xmlns:a16="http://schemas.microsoft.com/office/drawing/2014/main" id="{4276F326-CDF7-97EC-A691-DC0B3F0A482F}"/>
+              </a:ext>
+            </a:extLst>
+          </p:cNvPr>
+          <p:cNvSpPr txBox="1"/>
+          <p:nvPr/>
+        </p:nvSpPr>
+        <p:spPr>
+          <a:xfrm>
+            <a:off x="451704" y="3971346"/>
+            <a:ext cx="3466474" cy="400110"/>
+          </a:xfrm>
+          <a:prstGeom prst="rect">
+            <a:avLst/>
+          </a:prstGeom>
+          <a:noFill/>
+        </p:spPr>
+        <p:txBody>
+          <a:bodyPr wrap="square">
+            <a:spAutoFit/>
+          </a:bodyPr>
+          <a:lstStyle/>
+          <a:p>
+            <a:r>
+              <a:rPr lang="en-DE" sz="1000" dirty="0">
+                <a:solidFill>
+                  <a:srgbClr val="00B0F0"/>
+                </a:solidFill>
+              </a:rPr>
+              <a:t>https://paris21-data.github.io/CH_methodology_note/about-the-data.html#paris21-press-data</a:t>
+            </a:r>
+          </a:p>
+        </p:txBody>
+      </p:sp>
+      <p:sp>
+        <p:nvSpPr>
+          <p:cNvPr id="8" name="TextBox 7">
+            <a:extLst>
+              <a:ext uri="{FF2B5EF4-FFF2-40B4-BE49-F238E27FC236}">
+                <a16:creationId xmlns:a16="http://schemas.microsoft.com/office/drawing/2014/main" id="{CACECE12-B802-4E10-ABF3-0279BF550221}"/>
+              </a:ext>
+            </a:extLst>
+          </p:cNvPr>
+          <p:cNvSpPr txBox="1"/>
+          <p:nvPr/>
+        </p:nvSpPr>
+        <p:spPr>
+          <a:xfrm>
+            <a:off x="4408244" y="4356958"/>
+            <a:ext cx="3466474" cy="400110"/>
+          </a:xfrm>
+          <a:prstGeom prst="rect">
+            <a:avLst/>
+          </a:prstGeom>
+          <a:noFill/>
+        </p:spPr>
+        <p:txBody>
+          <a:bodyPr wrap="square">
+            <a:spAutoFit/>
+          </a:bodyPr>
+          <a:lstStyle/>
+          <a:p>
+            <a:r>
+              <a:rPr lang="en-DE" sz="1000" dirty="0">
+                <a:solidFill>
+                  <a:srgbClr val="00B0F0"/>
+                </a:solidFill>
+              </a:rPr>
+              <a:t>https://paris21-data.github.io/CH_methodology_note/about-the-data.html#paris21-press-data</a:t>
+            </a:r>
+          </a:p>
+        </p:txBody>
+      </p:sp>
+      <p:sp>
+        <p:nvSpPr>
+          <p:cNvPr id="20" name="TextBox 19">
+            <a:extLst>
+              <a:ext uri="{FF2B5EF4-FFF2-40B4-BE49-F238E27FC236}">
+                <a16:creationId xmlns:a16="http://schemas.microsoft.com/office/drawing/2014/main" id="{6EA7A506-C27D-D31E-84D1-5735153FC3EC}"/>
+              </a:ext>
+            </a:extLst>
+          </p:cNvPr>
+          <p:cNvSpPr txBox="1"/>
+          <p:nvPr/>
+        </p:nvSpPr>
+        <p:spPr>
+          <a:xfrm>
+            <a:off x="8290275" y="4346547"/>
+            <a:ext cx="3466474" cy="400110"/>
+          </a:xfrm>
+          <a:prstGeom prst="rect">
+            <a:avLst/>
+          </a:prstGeom>
+          <a:noFill/>
+        </p:spPr>
+        <p:txBody>
+          <a:bodyPr wrap="square">
+            <a:spAutoFit/>
+          </a:bodyPr>
+          <a:lstStyle/>
+          <a:p>
+            <a:r>
+              <a:rPr lang="en-DE" sz="1000" dirty="0">
+                <a:solidFill>
+                  <a:srgbClr val="00B0F0"/>
+                </a:solidFill>
+              </a:rPr>
+              <a:t>https://paris21-data.github.io/CH_methodology_note/about-the-data.html#paris21-press-data</a:t>
+            </a:r>
+          </a:p>
+        </p:txBody>
+      </p:sp>
     </p:spTree>
     <p:extLst>
       <p:ext uri="{BB962C8B-B14F-4D97-AF65-F5344CB8AC3E}">
@@ -17381,7 +19164,28 @@
                   </a:schemeClr>
                 </a:solidFill>
               </a:rPr>
-              <a:t>PARIS21 (2021), Partner Report on Support to Statistics. See the methodology note for details.</a:t>
+              <a:t>PARIS21 (2021), Partner Report on Support to Statistics. See the </a:t>
+            </a:r>
+            <a:r>
+              <a:rPr lang="en-US" sz="1000" dirty="0">
+                <a:solidFill>
+                  <a:schemeClr val="bg1">
+                    <a:lumMod val="50000"/>
+                  </a:schemeClr>
+                </a:solidFill>
+                <a:hlinkClick r:id="rId3"/>
+              </a:rPr>
+              <a:t>methodology note </a:t>
+            </a:r>
+            <a:r>
+              <a:rPr lang="en-US" sz="1000" dirty="0">
+                <a:solidFill>
+                  <a:schemeClr val="bg1">
+                    <a:lumMod val="50000"/>
+                  </a:schemeClr>
+                </a:solidFill>
+              </a:rPr>
+              <a:t>for details.</a:t>
             </a:r>
             <a:endParaRPr lang="en-GB" sz="1000" dirty="0">
               <a:solidFill>
@@ -17456,7 +19260,7 @@
                 <a:solidFill>
                   <a:schemeClr val="tx1"/>
                 </a:solidFill>
-                <a:hlinkClick r:id="rId3"/>
+                <a:hlinkClick r:id="rId4"/>
               </a:rPr>
               <a:t>nowcasting</a:t>
             </a:r>
@@ -17489,7 +19293,7 @@
                 <a:solidFill>
                   <a:schemeClr val="tx1"/>
                 </a:solidFill>
-                <a:hlinkClick r:id="rId4"/>
+                <a:hlinkClick r:id="rId5"/>
               </a:rPr>
               <a:t>forecasting</a:t>
             </a:r>
@@ -17628,7 +19432,7 @@
             <p:nvPr/>
           </p:nvPicPr>
           <p:blipFill rotWithShape="1">
-            <a:blip r:embed="rId5"/>
+            <a:blip r:embed="rId6"/>
             <a:srcRect r="37744" b="11026"/>
             <a:stretch/>
           </p:blipFill>
@@ -17651,7 +19455,7 @@
             <p:nvPr/>
           </p:nvPicPr>
           <p:blipFill>
-            <a:blip r:embed="rId6" cstate="print">
+            <a:blip r:embed="rId7" cstate="print">
               <a:extLst>
                 <a:ext uri="{28A0092B-C50C-407E-A947-70E740481C1C}">
                   <a14:useLocalDpi xmlns:a14="http://schemas.microsoft.com/office/drawing/2010/main" val="0"/>
@@ -17691,7 +19495,7 @@
         </p:nvSpPr>
         <p:spPr>
           <a:xfrm>
-            <a:off x="5688343" y="5857691"/>
+            <a:off x="5688343" y="5923998"/>
             <a:ext cx="6096000" cy="261610"/>
           </a:xfrm>
           <a:prstGeom prst="rect">
@@ -17765,6 +19569,45 @@
                 <a:srgbClr val="00B0F0"/>
               </a:solidFill>
             </a:endParaRPr>
+          </a:p>
+        </p:txBody>
+      </p:sp>
+      <p:sp>
+        <p:nvSpPr>
+          <p:cNvPr id="14" name="TextBox 13">
+            <a:extLst>
+              <a:ext uri="{FF2B5EF4-FFF2-40B4-BE49-F238E27FC236}">
+                <a16:creationId xmlns:a16="http://schemas.microsoft.com/office/drawing/2014/main" id="{40882BA4-F79B-4880-5AD1-E9B33ED7896B}"/>
+              </a:ext>
+            </a:extLst>
+          </p:cNvPr>
+          <p:cNvSpPr txBox="1"/>
+          <p:nvPr/>
+        </p:nvSpPr>
+        <p:spPr>
+          <a:xfrm>
+            <a:off x="4249270" y="3994187"/>
+            <a:ext cx="6096000" cy="246221"/>
+          </a:xfrm>
+          <a:prstGeom prst="rect">
+            <a:avLst/>
+          </a:prstGeom>
+          <a:noFill/>
+        </p:spPr>
+        <p:txBody>
+          <a:bodyPr wrap="square">
+            <a:spAutoFit/>
+          </a:bodyPr>
+          <a:lstStyle/>
+          <a:p>
+            <a:r>
+              <a:rPr lang="en-DE" sz="1000" dirty="0">
+                <a:solidFill>
+                  <a:srgbClr val="00B0F0"/>
+                </a:solidFill>
+              </a:rPr>
+              <a:t>https://paris21-data.github.io/CH_methodology_note/about-the-data.html#paris21-press-data</a:t>
+            </a:r>
           </a:p>
         </p:txBody>
       </p:sp>
@@ -17935,7 +19778,28 @@
                   </a:schemeClr>
                 </a:solidFill>
               </a:rPr>
-              <a:t>PARIS21 (2021), Partner Report on Support to Statistics. See the methodology note for details.</a:t>
+              <a:t>PARIS21 (2021), Partner Report on Support to Statistics. See the </a:t>
+            </a:r>
+            <a:r>
+              <a:rPr lang="en-US" sz="1200" dirty="0">
+                <a:solidFill>
+                  <a:schemeClr val="bg1">
+                    <a:lumMod val="50000"/>
+                  </a:schemeClr>
+                </a:solidFill>
+                <a:hlinkClick r:id="rId3"/>
+              </a:rPr>
+              <a:t>methodology note </a:t>
+            </a:r>
+            <a:r>
+              <a:rPr lang="en-US" sz="1200" dirty="0">
+                <a:solidFill>
+                  <a:schemeClr val="bg1">
+                    <a:lumMod val="50000"/>
+                  </a:schemeClr>
+                </a:solidFill>
+              </a:rPr>
+              <a:t>for details.</a:t>
             </a:r>
             <a:endParaRPr lang="en-GB" sz="1200" dirty="0">
               <a:solidFill>
@@ -18001,7 +19865,7 @@
                 <a:solidFill>
                   <a:schemeClr val="tx1"/>
                 </a:solidFill>
-                <a:hlinkClick r:id="rId3"/>
+                <a:hlinkClick r:id="rId4"/>
               </a:rPr>
               <a:t>gender data-relevant funding</a:t>
             </a:r>
@@ -18114,7 +19978,7 @@
             <p:nvPr/>
           </p:nvPicPr>
           <p:blipFill rotWithShape="1">
-            <a:blip r:embed="rId4"/>
+            <a:blip r:embed="rId5"/>
             <a:srcRect r="37744" b="11026"/>
             <a:stretch/>
           </p:blipFill>
@@ -18137,7 +20001,7 @@
             <p:nvPr/>
           </p:nvPicPr>
           <p:blipFill>
-            <a:blip r:embed="rId5" cstate="print">
+            <a:blip r:embed="rId6" cstate="print">
               <a:extLst>
                 <a:ext uri="{28A0092B-C50C-407E-A947-70E740481C1C}">
                   <a14:useLocalDpi xmlns:a14="http://schemas.microsoft.com/office/drawing/2010/main" val="0"/>
@@ -18199,6 +20063,50 @@
               </a:rPr>
               <a:t>https://paris21-data.github.io/CH_methodology_note/about-the-data.html#press-gender-data-financing-projects</a:t>
             </a:r>
+          </a:p>
+        </p:txBody>
+      </p:sp>
+      <p:sp>
+        <p:nvSpPr>
+          <p:cNvPr id="6" name="TextBox 5">
+            <a:extLst>
+              <a:ext uri="{FF2B5EF4-FFF2-40B4-BE49-F238E27FC236}">
+                <a16:creationId xmlns:a16="http://schemas.microsoft.com/office/drawing/2014/main" id="{79616B07-BD2D-0B99-993F-2BF950E33474}"/>
+              </a:ext>
+            </a:extLst>
+          </p:cNvPr>
+          <p:cNvSpPr txBox="1"/>
+          <p:nvPr/>
+        </p:nvSpPr>
+        <p:spPr>
+          <a:xfrm>
+            <a:off x="2659270" y="4703054"/>
+            <a:ext cx="6096000" cy="400110"/>
+          </a:xfrm>
+          <a:prstGeom prst="rect">
+            <a:avLst/>
+          </a:prstGeom>
+          <a:noFill/>
+        </p:spPr>
+        <p:txBody>
+          <a:bodyPr wrap="square">
+            <a:spAutoFit/>
+          </a:bodyPr>
+          <a:lstStyle/>
+          <a:p>
+            <a:r>
+              <a:rPr lang="en-US" sz="1000" dirty="0">
+                <a:solidFill>
+                  <a:srgbClr val="00B0F0"/>
+                </a:solidFill>
+              </a:rPr>
+              <a:t>https://paris21-data.github.io/CH_methodology_note/about-the-data.html#funding-opportunities-in-statistical-systems</a:t>
+            </a:r>
+            <a:endParaRPr lang="en-DE" sz="1000" dirty="0">
+              <a:solidFill>
+                <a:srgbClr val="00B0F0"/>
+              </a:solidFill>
+            </a:endParaRPr>
           </a:p>
         </p:txBody>
       </p:sp>
@@ -19291,38 +21199,6 @@
 </file>
 
 <file path=customXml/item1.xml><?xml version="1.0" encoding="utf-8"?>
-<?mso-contentType ?>
-<FormTemplates xmlns="http://schemas.microsoft.com/sharepoint/v3/contenttype/forms">
-  <Display>DocumentLibraryForm</Display>
-  <Edit>DocumentLibraryForm</Edit>
-  <New>DocumentLibraryForm</New>
-</FormTemplates>
-</file>
-
-<file path=customXml/item2.xml><?xml version="1.0" encoding="utf-8"?>
-<p:properties xmlns:p="http://schemas.microsoft.com/office/2006/metadata/properties" xmlns:xsi="http://www.w3.org/2001/XMLSchema-instance" xmlns:pc="http://schemas.microsoft.com/office/infopath/2007/PartnerControls">
-  <documentManagement>
-    <SharedWithUsers xmlns="9e054386-4ba3-4832-ba08-83d3dfeb74b7">
-      <UserInfo>
-        <DisplayName>SHARVADZE Giorgi, SDD/P21</DisplayName>
-        <AccountId>22</AccountId>
-        <AccountType/>
-      </UserInfo>
-      <UserInfo>
-        <DisplayName>INO Junya, SDD/P21</DisplayName>
-        <AccountId>24</AccountId>
-        <AccountType/>
-      </UserInfo>
-    </SharedWithUsers>
-    <lcf76f155ced4ddcb4097134ff3c332f xmlns="d920a496-69e2-45be-8a73-a59b360ec388">
-      <Terms xmlns="http://schemas.microsoft.com/office/infopath/2007/PartnerControls"/>
-    </lcf76f155ced4ddcb4097134ff3c332f>
-    <TaxCatchAll xmlns="9e054386-4ba3-4832-ba08-83d3dfeb74b7" xsi:nil="true"/>
-  </documentManagement>
-</p:properties>
-</file>
-
-<file path=customXml/item3.xml><?xml version="1.0" encoding="utf-8"?>
 <ct:contentTypeSchema xmlns:ct="http://schemas.microsoft.com/office/2006/metadata/contentType" xmlns:ma="http://schemas.microsoft.com/office/2006/metadata/properties/metaAttributes" ct:_="" ma:_="" ma:contentTypeName="Document" ma:contentTypeID="0x010100D091FE7943622F49AE25B3426763C6D1" ma:contentTypeVersion="15" ma:contentTypeDescription="Create a new document." ma:contentTypeScope="" ma:versionID="fa56124264d4a4080ad4e045111b8a45">
   <xsd:schema xmlns:xsd="http://www.w3.org/2001/XMLSchema" xmlns:xs="http://www.w3.org/2001/XMLSchema" xmlns:p="http://schemas.microsoft.com/office/2006/metadata/properties" xmlns:ns2="d920a496-69e2-45be-8a73-a59b360ec388" xmlns:ns3="9e054386-4ba3-4832-ba08-83d3dfeb74b7" targetNamespace="http://schemas.microsoft.com/office/2006/metadata/properties" ma:root="true" ma:fieldsID="51f83caea40f354edb0d150510baaffa" ns2:_="" ns3:_="">
     <xsd:import namespace="d920a496-69e2-45be-8a73-a59b360ec388"/>
@@ -19559,10 +21435,53 @@
 </ct:contentTypeSchema>
 </file>
 
+<file path=customXml/item2.xml><?xml version="1.0" encoding="utf-8"?>
+<p:properties xmlns:p="http://schemas.microsoft.com/office/2006/metadata/properties" xmlns:xsi="http://www.w3.org/2001/XMLSchema-instance" xmlns:pc="http://schemas.microsoft.com/office/infopath/2007/PartnerControls">
+  <documentManagement>
+    <SharedWithUsers xmlns="9e054386-4ba3-4832-ba08-83d3dfeb74b7">
+      <UserInfo>
+        <DisplayName>SHARVADZE Giorgi, SDD/P21</DisplayName>
+        <AccountId>22</AccountId>
+        <AccountType/>
+      </UserInfo>
+      <UserInfo>
+        <DisplayName>INO Junya, SDD/P21</DisplayName>
+        <AccountId>24</AccountId>
+        <AccountType/>
+      </UserInfo>
+    </SharedWithUsers>
+    <lcf76f155ced4ddcb4097134ff3c332f xmlns="d920a496-69e2-45be-8a73-a59b360ec388">
+      <Terms xmlns="http://schemas.microsoft.com/office/infopath/2007/PartnerControls"/>
+    </lcf76f155ced4ddcb4097134ff3c332f>
+    <TaxCatchAll xmlns="9e054386-4ba3-4832-ba08-83d3dfeb74b7" xsi:nil="true"/>
+  </documentManagement>
+</p:properties>
+</file>
+
+<file path=customXml/item3.xml><?xml version="1.0" encoding="utf-8"?>
+<?mso-contentType ?>
+<FormTemplates xmlns="http://schemas.microsoft.com/sharepoint/v3/contenttype/forms">
+  <Display>DocumentLibraryForm</Display>
+  <Edit>DocumentLibraryForm</Edit>
+  <New>DocumentLibraryForm</New>
+</FormTemplates>
+</file>
+
 <file path=customXml/itemProps1.xml><?xml version="1.0" encoding="utf-8"?>
-<ds:datastoreItem xmlns:ds="http://schemas.openxmlformats.org/officeDocument/2006/customXml" ds:itemID="{BE9F48CA-6EFE-49D7-94B7-E73904B35E32}">
+<ds:datastoreItem xmlns:ds="http://schemas.openxmlformats.org/officeDocument/2006/customXml" ds:itemID="{341BB8A1-78D1-46CC-BB77-8C22FF2F5200}">
   <ds:schemaRefs>
-    <ds:schemaRef ds:uri="http://schemas.microsoft.com/sharepoint/v3/contenttype/forms"/>
+    <ds:schemaRef ds:uri="http://schemas.microsoft.com/office/2006/metadata/contentType"/>
+    <ds:schemaRef ds:uri="http://schemas.microsoft.com/office/2006/metadata/properties/metaAttributes"/>
+    <ds:schemaRef ds:uri="http://www.w3.org/2001/XMLSchema"/>
+    <ds:schemaRef ds:uri="http://schemas.microsoft.com/office/2006/metadata/properties"/>
+    <ds:schemaRef ds:uri="d920a496-69e2-45be-8a73-a59b360ec388"/>
+    <ds:schemaRef ds:uri="9e054386-4ba3-4832-ba08-83d3dfeb74b7"/>
+    <ds:schemaRef ds:uri="http://schemas.microsoft.com/office/2006/documentManagement/types"/>
+    <ds:schemaRef ds:uri="http://schemas.microsoft.com/office/infopath/2007/PartnerControls"/>
+    <ds:schemaRef ds:uri="http://schemas.openxmlformats.org/package/2006/metadata/core-properties"/>
+    <ds:schemaRef ds:uri="http://purl.org/dc/elements/1.1/"/>
+    <ds:schemaRef ds:uri="http://purl.org/dc/terms/"/>
+    <ds:schemaRef ds:uri="http://schemas.microsoft.com/internal/obd"/>
   </ds:schemaRefs>
 </ds:datastoreItem>
 </file>
@@ -19585,20 +21504,9 @@
 </file>
 
 <file path=customXml/itemProps3.xml><?xml version="1.0" encoding="utf-8"?>
-<ds:datastoreItem xmlns:ds="http://schemas.openxmlformats.org/officeDocument/2006/customXml" ds:itemID="{341BB8A1-78D1-46CC-BB77-8C22FF2F5200}">
+<ds:datastoreItem xmlns:ds="http://schemas.openxmlformats.org/officeDocument/2006/customXml" ds:itemID="{BE9F48CA-6EFE-49D7-94B7-E73904B35E32}">
   <ds:schemaRefs>
-    <ds:schemaRef ds:uri="http://schemas.microsoft.com/office/2006/metadata/contentType"/>
-    <ds:schemaRef ds:uri="http://schemas.microsoft.com/office/2006/metadata/properties/metaAttributes"/>
-    <ds:schemaRef ds:uri="http://www.w3.org/2001/XMLSchema"/>
-    <ds:schemaRef ds:uri="http://schemas.microsoft.com/office/2006/metadata/properties"/>
-    <ds:schemaRef ds:uri="d920a496-69e2-45be-8a73-a59b360ec388"/>
-    <ds:schemaRef ds:uri="9e054386-4ba3-4832-ba08-83d3dfeb74b7"/>
-    <ds:schemaRef ds:uri="http://schemas.microsoft.com/office/2006/documentManagement/types"/>
-    <ds:schemaRef ds:uri="http://schemas.microsoft.com/office/infopath/2007/PartnerControls"/>
-    <ds:schemaRef ds:uri="http://schemas.openxmlformats.org/package/2006/metadata/core-properties"/>
-    <ds:schemaRef ds:uri="http://purl.org/dc/elements/1.1/"/>
-    <ds:schemaRef ds:uri="http://purl.org/dc/terms/"/>
-    <ds:schemaRef ds:uri="http://schemas.microsoft.com/internal/obd"/>
+    <ds:schemaRef ds:uri="http://schemas.microsoft.com/sharepoint/v3/contenttype/forms"/>
   </ds:schemaRefs>
 </ds:datastoreItem>
 </file>
</xml_diff>